<commit_message>
implementaçaõ da tela de dashboard(analytic) alterção dos banner de fundo da tela land-page,historia, alterção no script da modelagem e subindo documentação e ppt atualizadp
</commit_message>
<xml_diff>
--- a/Documentos/Apresentação.pptx
+++ b/Documentos/Apresentação.pptx
@@ -5,15 +5,16 @@
     <p:sldMasterId id="2147483660" r:id="rId4"/>
   </p:sldMasterIdLst>
   <p:notesMasterIdLst>
-    <p:notesMasterId r:id="rId11"/>
+    <p:notesMasterId r:id="rId12"/>
   </p:notesMasterIdLst>
   <p:sldIdLst>
     <p:sldId id="259" r:id="rId5"/>
     <p:sldId id="257" r:id="rId6"/>
     <p:sldId id="264" r:id="rId7"/>
     <p:sldId id="260" r:id="rId8"/>
-    <p:sldId id="262" r:id="rId9"/>
-    <p:sldId id="263" r:id="rId10"/>
+    <p:sldId id="265" r:id="rId9"/>
+    <p:sldId id="262" r:id="rId10"/>
+    <p:sldId id="263" r:id="rId11"/>
   </p:sldIdLst>
   <p:sldSz cx="12192000" cy="6858000"/>
   <p:notesSz cx="6858000" cy="9144000"/>
@@ -220,7 +221,7 @@
           <a:p>
             <a:fld id="{CD310C2B-22FE-44FA-8B4B-A062230DB383}" type="datetimeFigureOut">
               <a:rPr lang="pt-BR" smtClean="0"/>
-              <a:t>25/04/2023</a:t>
+              <a:t>29/04/2023</a:t>
             </a:fld>
             <a:endParaRPr lang="pt-BR"/>
           </a:p>
@@ -784,7 +785,7 @@
           <a:p>
             <a:fld id="{846CE7D5-CF57-46EF-B807-FDD0502418D4}" type="datetimeFigureOut">
               <a:rPr lang="en-US" smtClean="0"/>
-              <a:t>4/25/2023</a:t>
+              <a:t>4/29/2023</a:t>
             </a:fld>
             <a:endParaRPr lang="en-US"/>
           </a:p>
@@ -952,7 +953,7 @@
           <a:p>
             <a:fld id="{846CE7D5-CF57-46EF-B807-FDD0502418D4}" type="datetimeFigureOut">
               <a:rPr lang="en-US" smtClean="0"/>
-              <a:t>4/25/2023</a:t>
+              <a:t>4/29/2023</a:t>
             </a:fld>
             <a:endParaRPr lang="en-US"/>
           </a:p>
@@ -1130,7 +1131,7 @@
           <a:p>
             <a:fld id="{846CE7D5-CF57-46EF-B807-FDD0502418D4}" type="datetimeFigureOut">
               <a:rPr lang="en-US" smtClean="0"/>
-              <a:t>4/25/2023</a:t>
+              <a:t>4/29/2023</a:t>
             </a:fld>
             <a:endParaRPr lang="en-US"/>
           </a:p>
@@ -1298,7 +1299,7 @@
           <a:p>
             <a:fld id="{846CE7D5-CF57-46EF-B807-FDD0502418D4}" type="datetimeFigureOut">
               <a:rPr lang="en-US" smtClean="0"/>
-              <a:t>4/25/2023</a:t>
+              <a:t>4/29/2023</a:t>
             </a:fld>
             <a:endParaRPr lang="en-US"/>
           </a:p>
@@ -1543,7 +1544,7 @@
           <a:p>
             <a:fld id="{846CE7D5-CF57-46EF-B807-FDD0502418D4}" type="datetimeFigureOut">
               <a:rPr lang="en-US" smtClean="0"/>
-              <a:t>4/25/2023</a:t>
+              <a:t>4/29/2023</a:t>
             </a:fld>
             <a:endParaRPr lang="en-US"/>
           </a:p>
@@ -1772,7 +1773,7 @@
           <a:p>
             <a:fld id="{846CE7D5-CF57-46EF-B807-FDD0502418D4}" type="datetimeFigureOut">
               <a:rPr lang="en-US" smtClean="0"/>
-              <a:t>4/25/2023</a:t>
+              <a:t>4/29/2023</a:t>
             </a:fld>
             <a:endParaRPr lang="en-US"/>
           </a:p>
@@ -2136,7 +2137,7 @@
           <a:p>
             <a:fld id="{846CE7D5-CF57-46EF-B807-FDD0502418D4}" type="datetimeFigureOut">
               <a:rPr lang="en-US" smtClean="0"/>
-              <a:t>4/25/2023</a:t>
+              <a:t>4/29/2023</a:t>
             </a:fld>
             <a:endParaRPr lang="en-US"/>
           </a:p>
@@ -2253,7 +2254,7 @@
           <a:p>
             <a:fld id="{846CE7D5-CF57-46EF-B807-FDD0502418D4}" type="datetimeFigureOut">
               <a:rPr lang="en-US" smtClean="0"/>
-              <a:t>4/25/2023</a:t>
+              <a:t>4/29/2023</a:t>
             </a:fld>
             <a:endParaRPr lang="en-US"/>
           </a:p>
@@ -2348,7 +2349,7 @@
           <a:p>
             <a:fld id="{846CE7D5-CF57-46EF-B807-FDD0502418D4}" type="datetimeFigureOut">
               <a:rPr lang="en-US" smtClean="0"/>
-              <a:t>4/25/2023</a:t>
+              <a:t>4/29/2023</a:t>
             </a:fld>
             <a:endParaRPr lang="en-US"/>
           </a:p>
@@ -2623,7 +2624,7 @@
           <a:p>
             <a:fld id="{846CE7D5-CF57-46EF-B807-FDD0502418D4}" type="datetimeFigureOut">
               <a:rPr lang="en-US" smtClean="0"/>
-              <a:t>4/25/2023</a:t>
+              <a:t>4/29/2023</a:t>
             </a:fld>
             <a:endParaRPr lang="en-US"/>
           </a:p>
@@ -2878,7 +2879,7 @@
           <a:p>
             <a:fld id="{846CE7D5-CF57-46EF-B807-FDD0502418D4}" type="datetimeFigureOut">
               <a:rPr lang="en-US" smtClean="0"/>
-              <a:t>4/25/2023</a:t>
+              <a:t>4/29/2023</a:t>
             </a:fld>
             <a:endParaRPr lang="en-US"/>
           </a:p>
@@ -3089,7 +3090,7 @@
           <a:p>
             <a:fld id="{846CE7D5-CF57-46EF-B807-FDD0502418D4}" type="datetimeFigureOut">
               <a:rPr lang="en-US" smtClean="0"/>
-              <a:t>4/25/2023</a:t>
+              <a:t>4/29/2023</a:t>
             </a:fld>
             <a:endParaRPr lang="en-US"/>
           </a:p>
@@ -3504,10 +3505,10 @@
       </p:grpSpPr>
       <p:sp useBgFill="1">
         <p:nvSpPr>
-          <p:cNvPr id="92" name="Rectangle 91">
+          <p:cNvPr id="112" name="Rectangle 111">
             <a:extLst>
               <a:ext uri="{FF2B5EF4-FFF2-40B4-BE49-F238E27FC236}">
-                <a16:creationId xmlns:a16="http://schemas.microsoft.com/office/drawing/2014/main" id="{04812C46-200A-4DEB-A05E-3ED6C68C2387}"/>
+                <a16:creationId xmlns:a16="http://schemas.microsoft.com/office/drawing/2014/main" id="{0D7B6173-1D58-48E2-83CF-37350F315F75}"/>
               </a:ext>
               <a:ext uri="{C183D7F6-B498-43B3-948B-1728B52AA6E4}">
                 <adec:decorative xmlns:adec="http://schemas.microsoft.com/office/drawing/2017/decorative" val="1"/>
@@ -3527,7 +3528,7 @@
         </p:nvSpPr>
         <p:spPr>
           <a:xfrm>
-            <a:off x="3049" y="0"/>
+            <a:off x="0" y="-1"/>
             <a:ext cx="12188952" cy="6858000"/>
           </a:xfrm>
           <a:prstGeom prst="rect">
@@ -3558,51 +3559,16 @@
           <a:lstStyle/>
           <a:p>
             <a:pPr algn="ctr"/>
-            <a:endParaRPr lang="en-US" dirty="0"/>
+            <a:endParaRPr lang="en-US"/>
           </a:p>
         </p:txBody>
       </p:sp>
-      <p:pic>
-        <p:nvPicPr>
-          <p:cNvPr id="15" name="Imagem 14" descr="Imagem digital fictícia de personagem de desenho animado&#10;&#10;Descrição gerada automaticamente com confiança baixa">
+      <p:sp>
+        <p:nvSpPr>
+          <p:cNvPr id="114" name="Rectangle 113">
             <a:extLst>
               <a:ext uri="{FF2B5EF4-FFF2-40B4-BE49-F238E27FC236}">
-                <a16:creationId xmlns:a16="http://schemas.microsoft.com/office/drawing/2014/main" id="{C57DB49C-D104-FED1-F323-8E0127FD36E9}"/>
-              </a:ext>
-            </a:extLst>
-          </p:cNvPr>
-          <p:cNvPicPr>
-            <a:picLocks noChangeAspect="1"/>
-          </p:cNvPicPr>
-          <p:nvPr/>
-        </p:nvPicPr>
-        <p:blipFill rotWithShape="1">
-          <a:blip r:embed="rId3" cstate="print">
-            <a:extLst>
-              <a:ext uri="{28A0092B-C50C-407E-A947-70E740481C1C}">
-                <a14:useLocalDpi xmlns:a14="http://schemas.microsoft.com/office/drawing/2010/main" val="0"/>
-              </a:ext>
-            </a:extLst>
-          </a:blip>
-          <a:srcRect l="11327" r="23815" b="1"/>
-          <a:stretch/>
-        </p:blipFill>
-        <p:spPr>
-          <a:xfrm>
-            <a:off x="3179134" y="10"/>
-            <a:ext cx="9012863" cy="6857990"/>
-          </a:xfrm>
-          <a:prstGeom prst="rect">
-            <a:avLst/>
-          </a:prstGeom>
-        </p:spPr>
-      </p:pic>
-      <p:sp>
-        <p:nvSpPr>
-          <p:cNvPr id="94" name="Rectangle 93">
-            <a:extLst>
-              <a:ext uri="{FF2B5EF4-FFF2-40B4-BE49-F238E27FC236}">
-                <a16:creationId xmlns:a16="http://schemas.microsoft.com/office/drawing/2014/main" id="{D1EA859B-E555-4109-94F3-6700E046E008}"/>
+                <a16:creationId xmlns:a16="http://schemas.microsoft.com/office/drawing/2014/main" id="{2F36CA75-CFBF-4844-B719-8FE9EBADA9AF}"/>
               </a:ext>
               <a:ext uri="{C183D7F6-B498-43B3-948B-1728B52AA6E4}">
                 <adec:decorative xmlns:adec="http://schemas.microsoft.com/office/drawing/2017/decorative" val="1"/>
@@ -3622,38 +3588,17 @@
         </p:nvSpPr>
         <p:spPr>
           <a:xfrm>
-            <a:off x="-1" y="0"/>
-            <a:ext cx="7390263" cy="6858000"/>
+            <a:off x="0" y="0"/>
+            <a:ext cx="12188952" cy="6858000"/>
           </a:xfrm>
           <a:prstGeom prst="rect">
             <a:avLst/>
           </a:prstGeom>
-          <a:gradFill>
-            <a:gsLst>
-              <a:gs pos="48000">
-                <a:schemeClr val="bg1"/>
-              </a:gs>
-              <a:gs pos="35000">
-                <a:schemeClr val="bg1">
-                  <a:alpha val="77000"/>
-                </a:schemeClr>
-              </a:gs>
-              <a:gs pos="19000">
-                <a:schemeClr val="bg1">
-                  <a:alpha val="38000"/>
-                </a:schemeClr>
-              </a:gs>
-              <a:gs pos="0">
-                <a:schemeClr val="bg1">
-                  <a:alpha val="0"/>
-                </a:schemeClr>
-              </a:gs>
-              <a:gs pos="100000">
-                <a:schemeClr val="bg1"/>
-              </a:gs>
-            </a:gsLst>
-            <a:lin ang="10800000" scaled="0"/>
-          </a:gradFill>
+          <a:solidFill>
+            <a:schemeClr val="bg2">
+              <a:alpha val="50000"/>
+            </a:schemeClr>
+          </a:solidFill>
           <a:ln>
             <a:noFill/>
           </a:ln>
@@ -3685,6 +3630,402 @@
       </p:sp>
       <p:sp>
         <p:nvSpPr>
+          <p:cNvPr id="116" name="Rectangle 115">
+            <a:extLst>
+              <a:ext uri="{FF2B5EF4-FFF2-40B4-BE49-F238E27FC236}">
+                <a16:creationId xmlns:a16="http://schemas.microsoft.com/office/drawing/2014/main" id="{3D4A84B9-E564-4DD0-97F8-DBF1C460C28A}"/>
+              </a:ext>
+              <a:ext uri="{C183D7F6-B498-43B3-948B-1728B52AA6E4}">
+                <adec:decorative xmlns:adec="http://schemas.microsoft.com/office/drawing/2017/decorative" val="1"/>
+              </a:ext>
+            </a:extLst>
+          </p:cNvPr>
+          <p:cNvSpPr>
+            <a:spLocks noGrp="1" noRot="1" noChangeAspect="1" noMove="1" noResize="1" noEditPoints="1" noAdjustHandles="1" noChangeArrowheads="1" noChangeShapeType="1" noTextEdit="1"/>
+          </p:cNvSpPr>
+          <p:nvPr>
+            <p:extLst>
+              <p:ext uri="{386F3935-93C4-4BCD-93E2-E3B085C9AB24}">
+                <p16:designElem xmlns:p16="http://schemas.microsoft.com/office/powerpoint/2015/main" val="1"/>
+              </p:ext>
+            </p:extLst>
+          </p:nvPr>
+        </p:nvSpPr>
+        <p:spPr>
+          <a:xfrm>
+            <a:off x="0" y="0"/>
+            <a:ext cx="12188952" cy="6858000"/>
+          </a:xfrm>
+          <a:prstGeom prst="rect">
+            <a:avLst/>
+          </a:prstGeom>
+          <a:solidFill>
+            <a:srgbClr val="000000"/>
+          </a:solidFill>
+          <a:ln>
+            <a:noFill/>
+          </a:ln>
+        </p:spPr>
+        <p:style>
+          <a:lnRef idx="2">
+            <a:schemeClr val="accent1">
+              <a:shade val="50000"/>
+            </a:schemeClr>
+          </a:lnRef>
+          <a:fillRef idx="1">
+            <a:schemeClr val="accent1"/>
+          </a:fillRef>
+          <a:effectRef idx="0">
+            <a:schemeClr val="accent1"/>
+          </a:effectRef>
+          <a:fontRef idx="minor">
+            <a:schemeClr val="lt1"/>
+          </a:fontRef>
+        </p:style>
+        <p:txBody>
+          <a:bodyPr rtlCol="0" anchor="ctr"/>
+          <a:lstStyle/>
+          <a:p>
+            <a:pPr algn="ctr"/>
+            <a:endParaRPr lang="en-US"/>
+          </a:p>
+        </p:txBody>
+      </p:sp>
+      <p:pic>
+        <p:nvPicPr>
+          <p:cNvPr id="118" name="Picture 117">
+            <a:extLst>
+              <a:ext uri="{FF2B5EF4-FFF2-40B4-BE49-F238E27FC236}">
+                <a16:creationId xmlns:a16="http://schemas.microsoft.com/office/drawing/2014/main" id="{4A599609-F5C2-4A0B-A992-913F814A631A}"/>
+              </a:ext>
+              <a:ext uri="{C183D7F6-B498-43B3-948B-1728B52AA6E4}">
+                <adec:decorative xmlns:adec="http://schemas.microsoft.com/office/drawing/2017/decorative" val="1"/>
+              </a:ext>
+            </a:extLst>
+          </p:cNvPr>
+          <p:cNvPicPr>
+            <a:picLocks noGrp="1" noRot="1" noChangeAspect="1" noMove="1" noResize="1" noEditPoints="1" noAdjustHandles="1" noChangeArrowheads="1" noChangeShapeType="1" noCrop="1"/>
+          </p:cNvPicPr>
+          <p:nvPr>
+            <p:extLst>
+              <p:ext uri="{386F3935-93C4-4BCD-93E2-E3B085C9AB24}">
+                <p16:designElem xmlns:p16="http://schemas.microsoft.com/office/powerpoint/2015/main" val="1"/>
+              </p:ext>
+            </p:extLst>
+          </p:nvPr>
+        </p:nvPicPr>
+        <p:blipFill>
+          <a:blip r:embed="rId3">
+            <a:alphaModFix amt="40000"/>
+            <a:extLst>
+              <a:ext uri="{28A0092B-C50C-407E-A947-70E740481C1C}">
+                <a14:useLocalDpi xmlns:a14="http://schemas.microsoft.com/office/drawing/2010/main" val="0"/>
+              </a:ext>
+            </a:extLst>
+          </a:blip>
+          <a:stretch>
+            <a:fillRect/>
+          </a:stretch>
+        </p:blipFill>
+        <p:spPr>
+          <a:xfrm>
+            <a:off x="5414" y="0"/>
+            <a:ext cx="12181172" cy="6858000"/>
+          </a:xfrm>
+          <a:prstGeom prst="rect">
+            <a:avLst/>
+          </a:prstGeom>
+        </p:spPr>
+      </p:pic>
+      <p:sp>
+        <p:nvSpPr>
+          <p:cNvPr id="120" name="Rectangle 119">
+            <a:extLst>
+              <a:ext uri="{FF2B5EF4-FFF2-40B4-BE49-F238E27FC236}">
+                <a16:creationId xmlns:a16="http://schemas.microsoft.com/office/drawing/2014/main" id="{102382E0-0A09-46AE-B955-B911CAFE7F00}"/>
+              </a:ext>
+              <a:ext uri="{C183D7F6-B498-43B3-948B-1728B52AA6E4}">
+                <adec:decorative xmlns:adec="http://schemas.microsoft.com/office/drawing/2017/decorative" val="1"/>
+              </a:ext>
+            </a:extLst>
+          </p:cNvPr>
+          <p:cNvSpPr>
+            <a:spLocks noGrp="1" noRot="1" noChangeAspect="1" noMove="1" noResize="1" noEditPoints="1" noAdjustHandles="1" noChangeArrowheads="1" noChangeShapeType="1" noTextEdit="1"/>
+          </p:cNvSpPr>
+          <p:nvPr>
+            <p:extLst>
+              <p:ext uri="{386F3935-93C4-4BCD-93E2-E3B085C9AB24}">
+                <p16:designElem xmlns:p16="http://schemas.microsoft.com/office/powerpoint/2015/main" val="1"/>
+              </p:ext>
+            </p:extLst>
+          </p:nvPr>
+        </p:nvSpPr>
+        <p:spPr>
+          <a:xfrm>
+            <a:off x="0" y="0"/>
+            <a:ext cx="12188952" cy="6858000"/>
+          </a:xfrm>
+          <a:prstGeom prst="rect">
+            <a:avLst/>
+          </a:prstGeom>
+          <a:solidFill>
+            <a:schemeClr val="accent1">
+              <a:alpha val="20000"/>
+            </a:schemeClr>
+          </a:solidFill>
+          <a:ln>
+            <a:noFill/>
+          </a:ln>
+        </p:spPr>
+        <p:style>
+          <a:lnRef idx="2">
+            <a:schemeClr val="accent1">
+              <a:shade val="50000"/>
+            </a:schemeClr>
+          </a:lnRef>
+          <a:fillRef idx="1">
+            <a:schemeClr val="accent1"/>
+          </a:fillRef>
+          <a:effectRef idx="0">
+            <a:schemeClr val="accent1"/>
+          </a:effectRef>
+          <a:fontRef idx="minor">
+            <a:schemeClr val="lt1"/>
+          </a:fontRef>
+        </p:style>
+        <p:txBody>
+          <a:bodyPr rtlCol="0" anchor="ctr"/>
+          <a:lstStyle/>
+          <a:p>
+            <a:pPr algn="ctr"/>
+            <a:endParaRPr lang="en-US" dirty="0"/>
+          </a:p>
+        </p:txBody>
+      </p:sp>
+      <p:sp>
+        <p:nvSpPr>
+          <p:cNvPr id="122" name="Rectangle 121">
+            <a:extLst>
+              <a:ext uri="{FF2B5EF4-FFF2-40B4-BE49-F238E27FC236}">
+                <a16:creationId xmlns:a16="http://schemas.microsoft.com/office/drawing/2014/main" id="{7DE75D4A-0965-4973-BE75-DECCAC9A9614}"/>
+              </a:ext>
+              <a:ext uri="{C183D7F6-B498-43B3-948B-1728B52AA6E4}">
+                <adec:decorative xmlns:adec="http://schemas.microsoft.com/office/drawing/2017/decorative" val="1"/>
+              </a:ext>
+            </a:extLst>
+          </p:cNvPr>
+          <p:cNvSpPr>
+            <a:spLocks noGrp="1" noRot="1" noChangeAspect="1" noMove="1" noResize="1" noEditPoints="1" noAdjustHandles="1" noChangeArrowheads="1" noChangeShapeType="1" noTextEdit="1"/>
+          </p:cNvSpPr>
+          <p:nvPr>
+            <p:extLst>
+              <p:ext uri="{386F3935-93C4-4BCD-93E2-E3B085C9AB24}">
+                <p16:designElem xmlns:p16="http://schemas.microsoft.com/office/powerpoint/2015/main" val="1"/>
+              </p:ext>
+            </p:extLst>
+          </p:nvPr>
+        </p:nvSpPr>
+        <p:spPr bwMode="white">
+          <a:xfrm>
+            <a:off x="1524" y="0"/>
+            <a:ext cx="12188952" cy="6858000"/>
+          </a:xfrm>
+          <a:prstGeom prst="rect">
+            <a:avLst/>
+          </a:prstGeom>
+          <a:noFill/>
+          <a:ln>
+            <a:noFill/>
+          </a:ln>
+        </p:spPr>
+        <p:style>
+          <a:lnRef idx="2">
+            <a:schemeClr val="accent1">
+              <a:shade val="50000"/>
+            </a:schemeClr>
+          </a:lnRef>
+          <a:fillRef idx="1">
+            <a:schemeClr val="accent1"/>
+          </a:fillRef>
+          <a:effectRef idx="0">
+            <a:schemeClr val="accent1"/>
+          </a:effectRef>
+          <a:fontRef idx="minor">
+            <a:schemeClr val="lt1"/>
+          </a:fontRef>
+        </p:style>
+        <p:txBody>
+          <a:bodyPr rtlCol="0" anchor="ctr"/>
+          <a:lstStyle>
+            <a:defPPr>
+              <a:defRPr lang="en-US"/>
+            </a:defPPr>
+            <a:lvl1pPr marL="0" algn="l" defTabSz="914400" rtl="0" eaLnBrk="1" latinLnBrk="0" hangingPunct="1">
+              <a:defRPr sz="1800" kern="1200">
+                <a:solidFill>
+                  <a:schemeClr val="lt1"/>
+                </a:solidFill>
+                <a:latin typeface="+mn-lt"/>
+                <a:ea typeface="+mn-ea"/>
+                <a:cs typeface="+mn-cs"/>
+              </a:defRPr>
+            </a:lvl1pPr>
+            <a:lvl2pPr marL="457200" algn="l" defTabSz="914400" rtl="0" eaLnBrk="1" latinLnBrk="0" hangingPunct="1">
+              <a:defRPr sz="1800" kern="1200">
+                <a:solidFill>
+                  <a:schemeClr val="lt1"/>
+                </a:solidFill>
+                <a:latin typeface="+mn-lt"/>
+                <a:ea typeface="+mn-ea"/>
+                <a:cs typeface="+mn-cs"/>
+              </a:defRPr>
+            </a:lvl2pPr>
+            <a:lvl3pPr marL="914400" algn="l" defTabSz="914400" rtl="0" eaLnBrk="1" latinLnBrk="0" hangingPunct="1">
+              <a:defRPr sz="1800" kern="1200">
+                <a:solidFill>
+                  <a:schemeClr val="lt1"/>
+                </a:solidFill>
+                <a:latin typeface="+mn-lt"/>
+                <a:ea typeface="+mn-ea"/>
+                <a:cs typeface="+mn-cs"/>
+              </a:defRPr>
+            </a:lvl3pPr>
+            <a:lvl4pPr marL="1371600" algn="l" defTabSz="914400" rtl="0" eaLnBrk="1" latinLnBrk="0" hangingPunct="1">
+              <a:defRPr sz="1800" kern="1200">
+                <a:solidFill>
+                  <a:schemeClr val="lt1"/>
+                </a:solidFill>
+                <a:latin typeface="+mn-lt"/>
+                <a:ea typeface="+mn-ea"/>
+                <a:cs typeface="+mn-cs"/>
+              </a:defRPr>
+            </a:lvl4pPr>
+            <a:lvl5pPr marL="1828800" algn="l" defTabSz="914400" rtl="0" eaLnBrk="1" latinLnBrk="0" hangingPunct="1">
+              <a:defRPr sz="1800" kern="1200">
+                <a:solidFill>
+                  <a:schemeClr val="lt1"/>
+                </a:solidFill>
+                <a:latin typeface="+mn-lt"/>
+                <a:ea typeface="+mn-ea"/>
+                <a:cs typeface="+mn-cs"/>
+              </a:defRPr>
+            </a:lvl5pPr>
+            <a:lvl6pPr marL="2286000" algn="l" defTabSz="914400" rtl="0" eaLnBrk="1" latinLnBrk="0" hangingPunct="1">
+              <a:defRPr sz="1800" kern="1200">
+                <a:solidFill>
+                  <a:schemeClr val="lt1"/>
+                </a:solidFill>
+                <a:latin typeface="+mn-lt"/>
+                <a:ea typeface="+mn-ea"/>
+                <a:cs typeface="+mn-cs"/>
+              </a:defRPr>
+            </a:lvl6pPr>
+            <a:lvl7pPr marL="2743200" algn="l" defTabSz="914400" rtl="0" eaLnBrk="1" latinLnBrk="0" hangingPunct="1">
+              <a:defRPr sz="1800" kern="1200">
+                <a:solidFill>
+                  <a:schemeClr val="lt1"/>
+                </a:solidFill>
+                <a:latin typeface="+mn-lt"/>
+                <a:ea typeface="+mn-ea"/>
+                <a:cs typeface="+mn-cs"/>
+              </a:defRPr>
+            </a:lvl7pPr>
+            <a:lvl8pPr marL="3200400" algn="l" defTabSz="914400" rtl="0" eaLnBrk="1" latinLnBrk="0" hangingPunct="1">
+              <a:defRPr sz="1800" kern="1200">
+                <a:solidFill>
+                  <a:schemeClr val="lt1"/>
+                </a:solidFill>
+                <a:latin typeface="+mn-lt"/>
+                <a:ea typeface="+mn-ea"/>
+                <a:cs typeface="+mn-cs"/>
+              </a:defRPr>
+            </a:lvl8pPr>
+            <a:lvl9pPr marL="3657600" algn="l" defTabSz="914400" rtl="0" eaLnBrk="1" latinLnBrk="0" hangingPunct="1">
+              <a:defRPr sz="1800" kern="1200">
+                <a:solidFill>
+                  <a:schemeClr val="lt1"/>
+                </a:solidFill>
+                <a:latin typeface="+mn-lt"/>
+                <a:ea typeface="+mn-ea"/>
+                <a:cs typeface="+mn-cs"/>
+              </a:defRPr>
+            </a:lvl9pPr>
+          </a:lstStyle>
+          <a:p>
+            <a:pPr algn="ctr"/>
+            <a:endParaRPr lang="en-US"/>
+          </a:p>
+        </p:txBody>
+      </p:sp>
+      <p:pic>
+        <p:nvPicPr>
+          <p:cNvPr id="3" name="Imagem 2" descr="Imagem digital fictícia de personagem de desenho animado&#10;&#10;Descrição gerada automaticamente com confiança média">
+            <a:extLst>
+              <a:ext uri="{FF2B5EF4-FFF2-40B4-BE49-F238E27FC236}">
+                <a16:creationId xmlns:a16="http://schemas.microsoft.com/office/drawing/2014/main" id="{DC92741E-6E81-AC6B-FBA4-681345EB270A}"/>
+              </a:ext>
+            </a:extLst>
+          </p:cNvPr>
+          <p:cNvPicPr>
+            <a:picLocks noChangeAspect="1"/>
+          </p:cNvPicPr>
+          <p:nvPr/>
+        </p:nvPicPr>
+        <p:blipFill rotWithShape="1">
+          <a:blip r:embed="rId4">
+            <a:alphaModFix amt="60000"/>
+            <a:extLst>
+              <a:ext uri="{28A0092B-C50C-407E-A947-70E740481C1C}">
+                <a14:useLocalDpi xmlns:a14="http://schemas.microsoft.com/office/drawing/2010/main" val="0"/>
+              </a:ext>
+            </a:extLst>
+          </a:blip>
+          <a:srcRect l="9017" r="2094"/>
+          <a:stretch/>
+        </p:blipFill>
+        <p:spPr>
+          <a:xfrm>
+            <a:off x="20" y="10"/>
+            <a:ext cx="6095980" cy="6857990"/>
+          </a:xfrm>
+          <a:prstGeom prst="rect">
+            <a:avLst/>
+          </a:prstGeom>
+        </p:spPr>
+      </p:pic>
+      <p:pic>
+        <p:nvPicPr>
+          <p:cNvPr id="19" name="Imagem 18" descr="Logotipo, nome da empresa&#10;&#10;Descrição gerada automaticamente">
+            <a:extLst>
+              <a:ext uri="{FF2B5EF4-FFF2-40B4-BE49-F238E27FC236}">
+                <a16:creationId xmlns:a16="http://schemas.microsoft.com/office/drawing/2014/main" id="{1410C7FA-F665-E386-D1C4-6B118B959619}"/>
+              </a:ext>
+            </a:extLst>
+          </p:cNvPr>
+          <p:cNvPicPr>
+            <a:picLocks noChangeAspect="1"/>
+          </p:cNvPicPr>
+          <p:nvPr/>
+        </p:nvPicPr>
+        <p:blipFill rotWithShape="1">
+          <a:blip r:embed="rId5">
+            <a:alphaModFix amt="60000"/>
+          </a:blip>
+          <a:srcRect l="8742" r="2146"/>
+          <a:stretch/>
+        </p:blipFill>
+        <p:spPr>
+          <a:xfrm>
+            <a:off x="6096000" y="10"/>
+            <a:ext cx="6096000" cy="6857990"/>
+          </a:xfrm>
+          <a:prstGeom prst="rect">
+            <a:avLst/>
+          </a:prstGeom>
+        </p:spPr>
+      </p:pic>
+      <p:sp>
+        <p:nvSpPr>
           <p:cNvPr id="12" name="Title 1">
             <a:extLst>
               <a:ext uri="{FF2B5EF4-FFF2-40B4-BE49-F238E27FC236}">
@@ -3701,21 +4042,24 @@
         </p:nvSpPr>
         <p:spPr>
           <a:xfrm>
-            <a:off x="838200" y="365125"/>
-            <a:ext cx="3822189" cy="1899912"/>
+            <a:off x="1191965" y="552807"/>
+            <a:ext cx="9801854" cy="2790331"/>
           </a:xfrm>
         </p:spPr>
         <p:txBody>
-          <a:bodyPr vert="horz" lIns="91440" tIns="45720" rIns="91440" bIns="45720" rtlCol="0">
+          <a:bodyPr vert="horz" lIns="91440" tIns="45720" rIns="91440" bIns="45720" rtlCol="0" anchor="b">
             <a:normAutofit/>
           </a:bodyPr>
           <a:lstStyle/>
           <a:p>
-            <a:r>
-              <a:rPr lang="en-US" sz="8800" i="1" u="sng" dirty="0">
+            <a:pPr algn="ctr"/>
+            <a:r>
+              <a:rPr lang="en-US" sz="4800" i="1" u="sng">
                 <a:solidFill>
-                  <a:schemeClr val="accent2"/>
+                  <a:srgbClr val="FFFFFF"/>
                 </a:solidFill>
+                <a:latin typeface="Arial" panose="020B0604020202020204" pitchFamily="34" charset="0"/>
+                <a:cs typeface="Arial" panose="020B0604020202020204" pitchFamily="34" charset="0"/>
               </a:rPr>
               <a:t>Naruto</a:t>
             </a:r>
@@ -3740,69 +4084,43 @@
         </p:nvSpPr>
         <p:spPr>
           <a:xfrm>
-            <a:off x="838200" y="2434201"/>
-            <a:ext cx="3822189" cy="3742762"/>
+            <a:off x="1191966" y="3510476"/>
+            <a:ext cx="9801854" cy="2614231"/>
           </a:xfrm>
         </p:spPr>
         <p:txBody>
-          <a:bodyPr vert="horz" lIns="91440" tIns="45720" rIns="91440" bIns="45720" rtlCol="0">
+          <a:bodyPr vert="horz" lIns="91440" tIns="45720" rIns="91440" bIns="45720" rtlCol="0" anchor="t">
             <a:normAutofit/>
           </a:bodyPr>
           <a:lstStyle/>
           <a:p>
-            <a:pPr marL="0" indent="0">
+            <a:pPr marL="0" indent="0" algn="ctr">
               <a:buNone/>
             </a:pPr>
             <a:r>
-              <a:rPr lang="en-US" sz="2000" i="1" u="sng" dirty="0">
+              <a:rPr lang="en-US" sz="1800" i="1" u="sng">
                 <a:solidFill>
-                  <a:schemeClr val="accent2"/>
+                  <a:srgbClr val="FFFFFF"/>
                 </a:solidFill>
-                <a:cs typeface="Calibri"/>
+                <a:latin typeface="Arial" panose="020B0604020202020204" pitchFamily="34" charset="0"/>
+                <a:cs typeface="Arial" panose="020B0604020202020204" pitchFamily="34" charset="0"/>
               </a:rPr>
               <a:t>Will Gustavo Dantas Adolpho </a:t>
             </a:r>
           </a:p>
           <a:p>
-            <a:pPr marL="0" indent="0">
+            <a:pPr marL="0" indent="0" algn="ctr">
               <a:buNone/>
             </a:pPr>
-            <a:endParaRPr lang="en-US" sz="2000" dirty="0">
+            <a:endParaRPr lang="en-US" sz="1800">
+              <a:solidFill>
+                <a:srgbClr val="FFFFFF"/>
+              </a:solidFill>
               <a:cs typeface="Calibri"/>
             </a:endParaRPr>
           </a:p>
         </p:txBody>
       </p:sp>
-      <p:pic>
-        <p:nvPicPr>
-          <p:cNvPr id="19" name="Imagem 18">
-            <a:extLst>
-              <a:ext uri="{FF2B5EF4-FFF2-40B4-BE49-F238E27FC236}">
-                <a16:creationId xmlns:a16="http://schemas.microsoft.com/office/drawing/2014/main" id="{1410C7FA-F665-E386-D1C4-6B118B959619}"/>
-              </a:ext>
-            </a:extLst>
-          </p:cNvPr>
-          <p:cNvPicPr>
-            <a:picLocks noChangeAspect="1"/>
-          </p:cNvPicPr>
-          <p:nvPr/>
-        </p:nvPicPr>
-        <p:blipFill>
-          <a:blip r:embed="rId4"/>
-          <a:stretch>
-            <a:fillRect/>
-          </a:stretch>
-        </p:blipFill>
-        <p:spPr>
-          <a:xfrm>
-            <a:off x="150518" y="4819588"/>
-            <a:ext cx="1897033" cy="1899912"/>
-          </a:xfrm>
-          <a:prstGeom prst="rect">
-            <a:avLst/>
-          </a:prstGeom>
-        </p:spPr>
-      </p:pic>
     </p:spTree>
     <p:extLst>
       <p:ext uri="{BB962C8B-B14F-4D97-AF65-F5344CB8AC3E}">
@@ -4099,7 +4417,7 @@
         <p:spPr>
           <a:xfrm>
             <a:off x="6423691" y="3935169"/>
-            <a:ext cx="3569072" cy="1077218"/>
+            <a:ext cx="3569072" cy="1384995"/>
           </a:xfrm>
           <a:prstGeom prst="rect">
             <a:avLst/>
@@ -4115,37 +4433,18 @@
           </a:bodyPr>
           <a:lstStyle/>
           <a:p>
-            <a:r>
-              <a:rPr lang="en-US" sz="2400" b="1" dirty="0">
+            <a:pPr algn="ctr"/>
+            <a:r>
+              <a:rPr lang="en-US" sz="2200" b="1" dirty="0">
                 <a:solidFill>
                   <a:schemeClr val="accent2"/>
                 </a:solidFill>
                 <a:ea typeface="+mn-lt"/>
                 <a:cs typeface="+mn-lt"/>
               </a:rPr>
-              <a:t>Quais ferramentas </a:t>
-            </a:r>
-            <a:r>
-              <a:rPr lang="en-US" sz="2400" b="1" dirty="0" err="1">
-                <a:solidFill>
-                  <a:schemeClr val="accent2"/>
-                </a:solidFill>
-                <a:ea typeface="+mn-lt"/>
-                <a:cs typeface="+mn-lt"/>
-              </a:rPr>
-              <a:t>utilizei</a:t>
-            </a:r>
-            <a:r>
-              <a:rPr lang="en-US" sz="2400" b="1" dirty="0">
-                <a:solidFill>
-                  <a:schemeClr val="accent2"/>
-                </a:solidFill>
-                <a:ea typeface="+mn-lt"/>
-                <a:cs typeface="+mn-lt"/>
-              </a:rPr>
-              <a:t>?</a:t>
-            </a:r>
-            <a:endParaRPr lang="en-US" dirty="0">
+              <a:t>Quais ferramentas foram utilizadas?</a:t>
+            </a:r>
+            <a:endParaRPr lang="en-US" sz="2200" dirty="0">
               <a:solidFill>
                 <a:schemeClr val="accent2"/>
               </a:solidFill>
@@ -4462,10 +4761,10 @@
       </p:grpSpPr>
       <p:sp useBgFill="1">
         <p:nvSpPr>
-          <p:cNvPr id="28" name="Rectangle 21">
+          <p:cNvPr id="49" name="Rectangle 48">
             <a:extLst>
               <a:ext uri="{FF2B5EF4-FFF2-40B4-BE49-F238E27FC236}">
-                <a16:creationId xmlns:a16="http://schemas.microsoft.com/office/drawing/2014/main" id="{99F1FFA9-D672-408C-9220-ADEEC6ABDD09}"/>
+                <a16:creationId xmlns:a16="http://schemas.microsoft.com/office/drawing/2014/main" id="{D2B783EE-0239-4717-BBEA-8C9EAC61C824}"/>
               </a:ext>
               <a:ext uri="{C183D7F6-B498-43B3-948B-1728B52AA6E4}">
                 <adec:decorative xmlns:adec="http://schemas.microsoft.com/office/drawing/2017/decorative" val="1"/>
@@ -4486,7 +4785,7 @@
         <p:spPr>
           <a:xfrm>
             <a:off x="0" y="0"/>
-            <a:ext cx="12188952" cy="6858000"/>
+            <a:ext cx="12192000" cy="6858000"/>
           </a:xfrm>
           <a:prstGeom prst="rect">
             <a:avLst/>
@@ -4534,8 +4833,8 @@
         </p:nvSpPr>
         <p:spPr>
           <a:xfrm>
-            <a:off x="544110" y="1435965"/>
-            <a:ext cx="3816096" cy="3694373"/>
+            <a:off x="838201" y="1825625"/>
+            <a:ext cx="5092194" cy="4351338"/>
           </a:xfrm>
           <a:prstGeom prst="rect">
             <a:avLst/>
@@ -4546,7 +4845,7 @@
             <a:prstTxWarp prst="textNoShape">
               <a:avLst/>
             </a:prstTxWarp>
-            <a:normAutofit lnSpcReduction="10000"/>
+            <a:normAutofit/>
           </a:bodyPr>
           <a:lstStyle/>
           <a:p>
@@ -4561,11 +4860,16 @@
               <a:buChar char="•"/>
             </a:pPr>
             <a:r>
-              <a:rPr lang="pt-BR" b="1" dirty="0">
-                <a:latin typeface="Arial" panose="020B0604020202020204" pitchFamily="34" charset="0"/>
-                <a:cs typeface="Arial" panose="020B0604020202020204" pitchFamily="34" charset="0"/>
-              </a:rPr>
-              <a:t>O anime visa trabalhar  a importância dos laços de amizade e da justiça no mundo. Trabalhando em equipe tendemos a ter resultados melhores, além do trabalho duro e ser resiliente.</a:t>
+              <a:rPr lang="en-US" b="1" dirty="0"/>
+              <a:t>O anime visa </a:t>
+            </a:r>
+            <a:r>
+              <a:rPr lang="en-US" b="1" dirty="0" err="1"/>
+              <a:t>trabalhar</a:t>
+            </a:r>
+            <a:r>
+              <a:rPr lang="en-US" b="1" dirty="0"/>
+              <a:t>  há importância dos laços de amizade e da justiça no mundo. Trabalhando em equipe tendemos a ter resultados melhores, além do trabalho duro e ser resiliente.</a:t>
             </a:r>
           </a:p>
           <a:p>
@@ -4579,24 +4883,7 @@
               <a:buFont typeface="Arial" panose="020B0604020202020204" pitchFamily="34" charset="0"/>
               <a:buChar char="•"/>
             </a:pPr>
-            <a:endParaRPr lang="pt-BR" b="1" dirty="0">
-              <a:latin typeface="Arial" panose="020B0604020202020204" pitchFamily="34" charset="0"/>
-              <a:cs typeface="Arial" panose="020B0604020202020204" pitchFamily="34" charset="0"/>
-            </a:endParaRPr>
-          </a:p>
-          <a:p>
-            <a:pPr fontAlgn="base">
-              <a:lnSpc>
-                <a:spcPct val="90000"/>
-              </a:lnSpc>
-              <a:spcAft>
-                <a:spcPts val="600"/>
-              </a:spcAft>
-            </a:pPr>
-            <a:endParaRPr lang="pt-BR" dirty="0">
-              <a:latin typeface="Arial" panose="020B0604020202020204" pitchFamily="34" charset="0"/>
-              <a:cs typeface="Arial" panose="020B0604020202020204" pitchFamily="34" charset="0"/>
-            </a:endParaRPr>
+            <a:endParaRPr lang="en-US" b="1" dirty="0"/>
           </a:p>
           <a:p>
             <a:pPr indent="-228600" fontAlgn="base">
@@ -4609,23 +4896,36 @@
               <a:buFont typeface="Arial" panose="020B0604020202020204" pitchFamily="34" charset="0"/>
               <a:buChar char="•"/>
             </a:pPr>
-            <a:r>
-              <a:rPr lang="en-US" sz="2000" b="1" i="0" u="none" strike="noStrike" dirty="0">
+            <a:endParaRPr lang="en-US" dirty="0"/>
+          </a:p>
+          <a:p>
+            <a:pPr indent="-228600" fontAlgn="base">
+              <a:lnSpc>
+                <a:spcPct val="90000"/>
+              </a:lnSpc>
+              <a:spcAft>
+                <a:spcPts val="600"/>
+              </a:spcAft>
+              <a:buFont typeface="Arial" panose="020B0604020202020204" pitchFamily="34" charset="0"/>
+              <a:buChar char="•"/>
+            </a:pPr>
+            <a:r>
+              <a:rPr lang="en-US" b="1" i="0" u="none" strike="noStrike" dirty="0">
                 <a:effectLst/>
               </a:rPr>
               <a:t>Naruto tem valores </a:t>
             </a:r>
             <a:r>
-              <a:rPr lang="en-US" sz="2000" b="1" dirty="0"/>
-              <a:t>próximos aos meus, o que me fez ter uma paixão maior pelo anime e gostaria que mais pessoas assistissem a obra</a:t>
-            </a:r>
-            <a:r>
-              <a:rPr lang="en-US" sz="2000" b="1" i="0" u="none" strike="noStrike" dirty="0">
+              <a:rPr lang="en-US" b="1" dirty="0"/>
+              <a:t>próximos aos meus, o que me fez ter uma paixão maior pelo anime e gostaria que mais pessoas assistissem á obra</a:t>
+            </a:r>
+            <a:r>
+              <a:rPr lang="en-US" b="1" i="0" u="none" strike="noStrike" dirty="0">
                 <a:effectLst/>
               </a:rPr>
               <a:t>.</a:t>
             </a:r>
-            <a:endParaRPr lang="en-US" sz="2000" b="0" i="0" dirty="0">
+            <a:endParaRPr lang="en-US" b="0" i="0" dirty="0">
               <a:effectLst/>
             </a:endParaRPr>
           </a:p>
@@ -4640,16 +4940,108 @@
               <a:buFont typeface="Arial" panose="020B0604020202020204" pitchFamily="34" charset="0"/>
               <a:buChar char="•"/>
             </a:pPr>
-            <a:endParaRPr lang="en-US" sz="2000" dirty="0"/>
+            <a:endParaRPr lang="en-US" dirty="0"/>
+          </a:p>
+        </p:txBody>
+      </p:sp>
+      <p:sp>
+        <p:nvSpPr>
+          <p:cNvPr id="51" name="Oval 50">
+            <a:extLst>
+              <a:ext uri="{FF2B5EF4-FFF2-40B4-BE49-F238E27FC236}">
+                <a16:creationId xmlns:a16="http://schemas.microsoft.com/office/drawing/2014/main" id="{A7B99495-F43F-4D80-A44F-2CB4764EB90B}"/>
+              </a:ext>
+              <a:ext uri="{C183D7F6-B498-43B3-948B-1728B52AA6E4}">
+                <adec:decorative xmlns:adec="http://schemas.microsoft.com/office/drawing/2017/decorative" val="1"/>
+              </a:ext>
+            </a:extLst>
+          </p:cNvPr>
+          <p:cNvSpPr>
+            <a:spLocks noGrp="1" noRot="1" noChangeAspect="1" noMove="1" noResize="1" noEditPoints="1" noAdjustHandles="1" noChangeArrowheads="1" noChangeShapeType="1" noTextEdit="1"/>
+          </p:cNvSpPr>
+          <p:nvPr>
+            <p:extLst>
+              <p:ext uri="{386F3935-93C4-4BCD-93E2-E3B085C9AB24}">
+                <p16:designElem xmlns:p16="http://schemas.microsoft.com/office/powerpoint/2015/main" val="1"/>
+              </p:ext>
+            </p:extLst>
+          </p:nvPr>
+        </p:nvSpPr>
+        <p:spPr>
+          <a:xfrm>
+            <a:off x="10420569" y="1364732"/>
+            <a:ext cx="947488" cy="921785"/>
+          </a:xfrm>
+          <a:prstGeom prst="ellipse">
+            <a:avLst/>
+          </a:prstGeom>
+          <a:solidFill>
+            <a:schemeClr val="accent2"/>
+          </a:solidFill>
+          <a:ln>
+            <a:noFill/>
+          </a:ln>
+        </p:spPr>
+        <p:style>
+          <a:lnRef idx="2">
+            <a:schemeClr val="accent1">
+              <a:shade val="50000"/>
+            </a:schemeClr>
+          </a:lnRef>
+          <a:fillRef idx="1">
+            <a:schemeClr val="accent1"/>
+          </a:fillRef>
+          <a:effectRef idx="0">
+            <a:schemeClr val="accent1"/>
+          </a:effectRef>
+          <a:fontRef idx="minor">
+            <a:schemeClr val="lt1"/>
+          </a:fontRef>
+        </p:style>
+        <p:txBody>
+          <a:bodyPr rtlCol="0" anchor="ctr"/>
+          <a:lstStyle/>
+          <a:p>
+            <a:pPr marL="0" marR="0" lvl="0" indent="0" algn="ctr" defTabSz="914400" rtl="0" eaLnBrk="1" fontAlgn="auto" latinLnBrk="0" hangingPunct="1">
+              <a:lnSpc>
+                <a:spcPct val="100000"/>
+              </a:lnSpc>
+              <a:spcBef>
+                <a:spcPts val="0"/>
+              </a:spcBef>
+              <a:spcAft>
+                <a:spcPts val="0"/>
+              </a:spcAft>
+              <a:buClrTx/>
+              <a:buSzTx/>
+              <a:buFontTx/>
+              <a:buNone/>
+              <a:tabLst/>
+              <a:defRPr/>
+            </a:pPr>
+            <a:endParaRPr kumimoji="0" lang="en-US" sz="1800" b="0" i="0" u="none" strike="noStrike" kern="1200" cap="none" spc="0" normalizeH="0" baseline="0" noProof="0">
+              <a:ln>
+                <a:noFill/>
+              </a:ln>
+              <a:solidFill>
+                <a:srgbClr val="FFFFFF"/>
+              </a:solidFill>
+              <a:effectLst/>
+              <a:uLnTx/>
+              <a:uFillTx/>
+              <a:latin typeface="Calibri" panose="020F0502020204030204"/>
+              <a:ea typeface="+mn-ea"/>
+              <a:cs typeface="+mn-cs"/>
+            </a:endParaRPr>
           </a:p>
         </p:txBody>
       </p:sp>
       <p:pic>
         <p:nvPicPr>
-          <p:cNvPr id="3" name="Imagem 2" descr="Desenho de personagem de desenho animado&#10;&#10;Descrição gerada automaticamente">
+          <p:cNvPr id="4" name="Imagem 3" descr="Imagem digital fictícia de personagem de desenho animado&#10;&#10;Descrição gerada automaticamente com confiança baixa">
             <a:extLst>
               <a:ext uri="{FF2B5EF4-FFF2-40B4-BE49-F238E27FC236}">
-                <a16:creationId xmlns:a16="http://schemas.microsoft.com/office/drawing/2014/main" id="{43C5C99C-3F77-C236-81BF-353F3F3A176F}"/>
+                <a16:creationId xmlns:a16="http://schemas.microsoft.com/office/drawing/2014/main" id="{EEFCE4D8-D090-6AA3-8A5E-B43EA9D2AD6D}"/>
               </a:ext>
             </a:extLst>
           </p:cNvPr>
@@ -4666,13 +5058,13 @@
               </a:ext>
             </a:extLst>
           </a:blip>
-          <a:srcRect t="6732" r="-1" b="3145"/>
+          <a:srcRect t="3740" r="1" b="1"/>
           <a:stretch/>
         </p:blipFill>
         <p:spPr>
           <a:xfrm>
-            <a:off x="4904316" y="-4"/>
-            <a:ext cx="7287684" cy="3694372"/>
+            <a:off x="7901259" y="2727729"/>
+            <a:ext cx="4290741" cy="4130271"/>
           </a:xfrm>
           <a:custGeom>
             <a:avLst/>
@@ -4681,351 +5073,36 @@
             <a:cxnLst/>
             <a:rect l="l" t="t" r="r" b="b"/>
             <a:pathLst>
-              <a:path w="7287684" h="3694372">
+              <a:path w="4290741" h="4130271">
                 <a:moveTo>
-                  <a:pt x="1047969" y="0"/>
+                  <a:pt x="2503809" y="0"/>
                 </a:moveTo>
+                <a:cubicBezTo>
+                  <a:pt x="3157405" y="0"/>
+                  <a:pt x="3752509" y="250434"/>
+                  <a:pt x="4198398" y="660580"/>
+                </a:cubicBezTo>
                 <a:lnTo>
-                  <a:pt x="7287684" y="0"/>
+                  <a:pt x="4290741" y="751286"/>
                 </a:lnTo>
                 <a:lnTo>
-                  <a:pt x="7287684" y="814388"/>
+                  <a:pt x="4290741" y="4130271"/>
                 </a:lnTo>
                 <a:lnTo>
-                  <a:pt x="7287684" y="3694372"/>
+                  <a:pt x="604508" y="4130271"/>
                 </a:lnTo>
                 <a:lnTo>
-                  <a:pt x="471411" y="3694372"/>
+                  <a:pt x="461940" y="3953232"/>
                 </a:lnTo>
-                <a:lnTo>
-                  <a:pt x="470992" y="3686621"/>
-                </a:lnTo>
-                <a:cubicBezTo>
-                  <a:pt x="458999" y="3642419"/>
-                  <a:pt x="427907" y="3602236"/>
-                  <a:pt x="376383" y="3554015"/>
-                </a:cubicBezTo>
-                <a:cubicBezTo>
-                  <a:pt x="315976" y="3500438"/>
-                  <a:pt x="255568" y="3454003"/>
-                  <a:pt x="170288" y="3407569"/>
-                </a:cubicBezTo>
-                <a:cubicBezTo>
-                  <a:pt x="365723" y="3382565"/>
-                  <a:pt x="163181" y="3296841"/>
-                  <a:pt x="230695" y="3243263"/>
-                </a:cubicBezTo>
-                <a:cubicBezTo>
-                  <a:pt x="369276" y="3221831"/>
-                  <a:pt x="479431" y="3393282"/>
-                  <a:pt x="667759" y="3343275"/>
-                </a:cubicBezTo>
-                <a:cubicBezTo>
-                  <a:pt x="440344" y="3196828"/>
-                  <a:pt x="184501" y="3150393"/>
-                  <a:pt x="17493" y="2953940"/>
-                </a:cubicBezTo>
-                <a:cubicBezTo>
-                  <a:pt x="56580" y="2911078"/>
-                  <a:pt x="95667" y="2953940"/>
-                  <a:pt x="127647" y="2936081"/>
-                </a:cubicBezTo>
-                <a:cubicBezTo>
-                  <a:pt x="127647" y="2925365"/>
-                  <a:pt x="500751" y="2993232"/>
-                  <a:pt x="522071" y="2714625"/>
-                </a:cubicBezTo>
-                <a:cubicBezTo>
-                  <a:pt x="529178" y="2714625"/>
-                  <a:pt x="536285" y="2714625"/>
-                  <a:pt x="543391" y="2703909"/>
-                </a:cubicBezTo>
-                <a:cubicBezTo>
-                  <a:pt x="582478" y="2664619"/>
-                  <a:pt x="546945" y="2571750"/>
-                  <a:pt x="610905" y="2564606"/>
-                </a:cubicBezTo>
-                <a:cubicBezTo>
-                  <a:pt x="681973" y="2557462"/>
-                  <a:pt x="749487" y="2525315"/>
-                  <a:pt x="824107" y="2543175"/>
-                </a:cubicBezTo>
-                <a:cubicBezTo>
-                  <a:pt x="880961" y="2557462"/>
-                  <a:pt x="941368" y="2575322"/>
-                  <a:pt x="1001776" y="2575322"/>
-                </a:cubicBezTo>
-                <a:cubicBezTo>
-                  <a:pt x="1065736" y="2575322"/>
-                  <a:pt x="1154570" y="2696766"/>
-                  <a:pt x="1193658" y="2536031"/>
-                </a:cubicBezTo>
-                <a:cubicBezTo>
-                  <a:pt x="1193658" y="2528888"/>
-                  <a:pt x="1303812" y="2546747"/>
-                  <a:pt x="1364219" y="2553891"/>
-                </a:cubicBezTo>
-                <a:cubicBezTo>
-                  <a:pt x="1413966" y="2561035"/>
-                  <a:pt x="1474374" y="2593181"/>
-                  <a:pt x="1509907" y="2528888"/>
-                </a:cubicBezTo>
-                <a:cubicBezTo>
-                  <a:pt x="1527674" y="2489596"/>
-                  <a:pt x="1442393" y="2418159"/>
-                  <a:pt x="1367772" y="2411015"/>
-                </a:cubicBezTo>
-                <a:cubicBezTo>
-                  <a:pt x="1300259" y="2403872"/>
-                  <a:pt x="1232745" y="2396728"/>
-                  <a:pt x="1168784" y="2411015"/>
-                </a:cubicBezTo>
-                <a:cubicBezTo>
-                  <a:pt x="1090610" y="2428875"/>
-                  <a:pt x="1047969" y="2400300"/>
-                  <a:pt x="1026649" y="2336007"/>
-                </a:cubicBezTo>
-                <a:cubicBezTo>
-                  <a:pt x="1001776" y="2268141"/>
-                  <a:pt x="955582" y="2232422"/>
-                  <a:pt x="891621" y="2200275"/>
-                </a:cubicBezTo>
-                <a:cubicBezTo>
-                  <a:pt x="735273" y="2121694"/>
-                  <a:pt x="586032" y="2028825"/>
-                  <a:pt x="415470" y="1982390"/>
-                </a:cubicBezTo>
-                <a:cubicBezTo>
-                  <a:pt x="383490" y="1975246"/>
-                  <a:pt x="344403" y="1960959"/>
-                  <a:pt x="330189" y="1900238"/>
-                </a:cubicBezTo>
-                <a:cubicBezTo>
-                  <a:pt x="792127" y="1993106"/>
-                  <a:pt x="1211424" y="2232422"/>
-                  <a:pt x="1687576" y="2218135"/>
-                </a:cubicBezTo>
-                <a:cubicBezTo>
-                  <a:pt x="1559654" y="2143125"/>
-                  <a:pt x="1406860" y="2139554"/>
-                  <a:pt x="1268278" y="2085975"/>
-                </a:cubicBezTo>
-                <a:cubicBezTo>
-                  <a:pt x="1367772" y="2046685"/>
-                  <a:pt x="1460160" y="2089547"/>
-                  <a:pt x="1552548" y="2110978"/>
-                </a:cubicBezTo>
-                <a:cubicBezTo>
-                  <a:pt x="1630722" y="2128837"/>
-                  <a:pt x="1701789" y="2132410"/>
-                  <a:pt x="1708896" y="2021681"/>
-                </a:cubicBezTo>
-                <a:cubicBezTo>
-                  <a:pt x="1708896" y="2010965"/>
-                  <a:pt x="1708896" y="2003821"/>
-                  <a:pt x="1708896" y="1993106"/>
-                </a:cubicBezTo>
-                <a:cubicBezTo>
-                  <a:pt x="1680469" y="1946672"/>
-                  <a:pt x="1641382" y="1925240"/>
-                  <a:pt x="1591635" y="1910953"/>
-                </a:cubicBezTo>
-                <a:cubicBezTo>
-                  <a:pt x="1563208" y="1903809"/>
-                  <a:pt x="1524121" y="1889522"/>
-                  <a:pt x="1524121" y="1857375"/>
-                </a:cubicBezTo>
-                <a:cubicBezTo>
-                  <a:pt x="1527674" y="1735931"/>
-                  <a:pt x="1431733" y="1700212"/>
-                  <a:pt x="1339346" y="1664493"/>
-                </a:cubicBezTo>
-                <a:cubicBezTo>
-                  <a:pt x="1389093" y="1603772"/>
-                  <a:pt x="1431733" y="1646635"/>
-                  <a:pt x="1470820" y="1643062"/>
-                </a:cubicBezTo>
-                <a:cubicBezTo>
-                  <a:pt x="1495694" y="1639491"/>
-                  <a:pt x="1520567" y="1635919"/>
-                  <a:pt x="1520567" y="1603772"/>
-                </a:cubicBezTo>
-                <a:cubicBezTo>
-                  <a:pt x="1520567" y="1578769"/>
-                  <a:pt x="1509907" y="1546622"/>
-                  <a:pt x="1485034" y="1546622"/>
-                </a:cubicBezTo>
-                <a:cubicBezTo>
-                  <a:pt x="1328686" y="1543050"/>
-                  <a:pt x="1239851" y="1371600"/>
-                  <a:pt x="1076396" y="1371600"/>
-                </a:cubicBezTo>
-                <a:cubicBezTo>
-                  <a:pt x="976902" y="1371600"/>
-                  <a:pt x="1126144" y="1275159"/>
-                  <a:pt x="1044416" y="1235869"/>
-                </a:cubicBezTo>
-                <a:cubicBezTo>
-                  <a:pt x="1026649" y="1225153"/>
-                  <a:pt x="1094163" y="1210866"/>
-                  <a:pt x="1122590" y="1214437"/>
-                </a:cubicBezTo>
-                <a:cubicBezTo>
-                  <a:pt x="1151017" y="1218009"/>
-                  <a:pt x="1175891" y="1243013"/>
-                  <a:pt x="1211424" y="1225153"/>
-                </a:cubicBezTo>
-                <a:cubicBezTo>
-                  <a:pt x="1229191" y="1160860"/>
-                  <a:pt x="1182997" y="1135856"/>
-                  <a:pt x="1140357" y="1117997"/>
-                </a:cubicBezTo>
-                <a:cubicBezTo>
-                  <a:pt x="1047969" y="1075135"/>
-                  <a:pt x="955582" y="1025129"/>
-                  <a:pt x="852534" y="1010841"/>
-                </a:cubicBezTo>
-                <a:cubicBezTo>
-                  <a:pt x="817001" y="1007269"/>
-                  <a:pt x="795680" y="989409"/>
-                  <a:pt x="799234" y="953690"/>
-                </a:cubicBezTo>
-                <a:cubicBezTo>
-                  <a:pt x="806340" y="907256"/>
-                  <a:pt x="841874" y="921544"/>
-                  <a:pt x="870301" y="925115"/>
-                </a:cubicBezTo>
-                <a:cubicBezTo>
-                  <a:pt x="888068" y="928688"/>
-                  <a:pt x="905835" y="939403"/>
-                  <a:pt x="923602" y="914400"/>
-                </a:cubicBezTo>
-                <a:cubicBezTo>
-                  <a:pt x="611794" y="724198"/>
-                  <a:pt x="409919" y="684684"/>
-                  <a:pt x="132090" y="589415"/>
-                </a:cubicBezTo>
-                <a:lnTo>
-                  <a:pt x="31922" y="552917"/>
-                </a:lnTo>
-                <a:lnTo>
-                  <a:pt x="26859" y="541335"/>
-                </a:lnTo>
-                <a:cubicBezTo>
-                  <a:pt x="20137" y="534929"/>
-                  <a:pt x="8953" y="532232"/>
-                  <a:pt x="0" y="527681"/>
-                </a:cubicBezTo>
-                <a:cubicBezTo>
-                  <a:pt x="5969" y="516305"/>
-                  <a:pt x="7617" y="502963"/>
-                  <a:pt x="17905" y="493550"/>
-                </a:cubicBezTo>
-                <a:cubicBezTo>
-                  <a:pt x="23947" y="488022"/>
-                  <a:pt x="35344" y="487159"/>
-                  <a:pt x="44763" y="486724"/>
-                </a:cubicBezTo>
-                <a:lnTo>
-                  <a:pt x="165722" y="483650"/>
-                </a:lnTo>
-                <a:lnTo>
-                  <a:pt x="193385" y="498723"/>
-                </a:lnTo>
-                <a:cubicBezTo>
-                  <a:pt x="210263" y="511671"/>
-                  <a:pt x="227142" y="525066"/>
-                  <a:pt x="315976" y="535781"/>
-                </a:cubicBezTo>
-                <a:cubicBezTo>
-                  <a:pt x="401257" y="546497"/>
-                  <a:pt x="479431" y="582216"/>
-                  <a:pt x="575372" y="525066"/>
-                </a:cubicBezTo>
-                <a:cubicBezTo>
-                  <a:pt x="639332" y="485775"/>
-                  <a:pt x="742380" y="528637"/>
-                  <a:pt x="820554" y="560785"/>
-                </a:cubicBezTo>
-                <a:cubicBezTo>
-                  <a:pt x="884515" y="589360"/>
-                  <a:pt x="948475" y="596503"/>
-                  <a:pt x="1033756" y="560785"/>
-                </a:cubicBezTo>
-                <a:cubicBezTo>
-                  <a:pt x="955582" y="539354"/>
-                  <a:pt x="895175" y="521494"/>
-                  <a:pt x="834767" y="507206"/>
-                </a:cubicBezTo>
-                <a:cubicBezTo>
-                  <a:pt x="785020" y="496491"/>
-                  <a:pt x="756593" y="471488"/>
-                  <a:pt x="760147" y="417909"/>
-                </a:cubicBezTo>
-                <a:cubicBezTo>
-                  <a:pt x="760147" y="389334"/>
-                  <a:pt x="749487" y="350044"/>
-                  <a:pt x="785020" y="335757"/>
-                </a:cubicBezTo>
-                <a:cubicBezTo>
-                  <a:pt x="813447" y="321469"/>
-                  <a:pt x="852534" y="335757"/>
-                  <a:pt x="866748" y="360759"/>
-                </a:cubicBezTo>
-                <a:cubicBezTo>
-                  <a:pt x="884515" y="407194"/>
-                  <a:pt x="902281" y="450056"/>
-                  <a:pt x="962689" y="453629"/>
-                </a:cubicBezTo>
-                <a:cubicBezTo>
-                  <a:pt x="1044416" y="460771"/>
-                  <a:pt x="998222" y="432197"/>
-                  <a:pt x="984009" y="396478"/>
-                </a:cubicBezTo>
-                <a:cubicBezTo>
-                  <a:pt x="969795" y="357188"/>
-                  <a:pt x="1012436" y="346472"/>
-                  <a:pt x="1040863" y="353615"/>
-                </a:cubicBezTo>
-                <a:cubicBezTo>
-                  <a:pt x="1147464" y="385763"/>
-                  <a:pt x="1257618" y="328613"/>
-                  <a:pt x="1367772" y="375047"/>
-                </a:cubicBezTo>
-                <a:cubicBezTo>
-                  <a:pt x="1339346" y="260747"/>
-                  <a:pt x="1278938" y="210741"/>
-                  <a:pt x="1151017" y="192881"/>
-                </a:cubicBezTo>
-                <a:cubicBezTo>
-                  <a:pt x="1104823" y="189310"/>
-                  <a:pt x="1055076" y="196453"/>
-                  <a:pt x="1012436" y="164306"/>
-                </a:cubicBezTo>
-                <a:cubicBezTo>
-                  <a:pt x="987562" y="146447"/>
-                  <a:pt x="962689" y="125016"/>
-                  <a:pt x="980456" y="89297"/>
-                </a:cubicBezTo>
-                <a:cubicBezTo>
-                  <a:pt x="991116" y="64294"/>
-                  <a:pt x="1019542" y="64294"/>
-                  <a:pt x="1044416" y="71437"/>
-                </a:cubicBezTo>
-                <a:cubicBezTo>
-                  <a:pt x="1147464" y="110728"/>
-                  <a:pt x="1257618" y="121444"/>
-                  <a:pt x="1364219" y="135731"/>
-                </a:cubicBezTo>
-                <a:cubicBezTo>
-                  <a:pt x="1381986" y="139303"/>
-                  <a:pt x="1399753" y="146447"/>
-                  <a:pt x="1417520" y="110728"/>
-                </a:cubicBezTo>
-                <a:cubicBezTo>
-                  <a:pt x="1293152" y="78581"/>
-                  <a:pt x="1172337" y="35719"/>
-                  <a:pt x="1047969" y="0"/>
+                <a:cubicBezTo>
+                  <a:pt x="171051" y="3544183"/>
+                  <a:pt x="0" y="3043971"/>
+                  <a:pt x="0" y="2503809"/>
+                </a:cubicBezTo>
+                <a:cubicBezTo>
+                  <a:pt x="0" y="1120992"/>
+                  <a:pt x="1120992" y="0"/>
+                  <a:pt x="2503809" y="0"/>
                 </a:cubicBezTo>
                 <a:close/>
               </a:path>
@@ -5033,6 +5110,70 @@
           </a:custGeom>
         </p:spPr>
       </p:pic>
+      <p:sp>
+        <p:nvSpPr>
+          <p:cNvPr id="53" name="Arc 52">
+            <a:extLst>
+              <a:ext uri="{FF2B5EF4-FFF2-40B4-BE49-F238E27FC236}">
+                <a16:creationId xmlns:a16="http://schemas.microsoft.com/office/drawing/2014/main" id="{70BEB1E7-2F88-40BC-B73D-42E5B6F80BFC}"/>
+              </a:ext>
+              <a:ext uri="{C183D7F6-B498-43B3-948B-1728B52AA6E4}">
+                <adec:decorative xmlns:adec="http://schemas.microsoft.com/office/drawing/2017/decorative" val="1"/>
+              </a:ext>
+            </a:extLst>
+          </p:cNvPr>
+          <p:cNvSpPr>
+            <a:spLocks noGrp="1" noRot="1" noChangeAspect="1" noMove="1" noResize="1" noEditPoints="1" noAdjustHandles="1" noChangeArrowheads="1" noChangeShapeType="1" noTextEdit="1"/>
+          </p:cNvSpPr>
+          <p:nvPr>
+            <p:extLst>
+              <p:ext uri="{386F3935-93C4-4BCD-93E2-E3B085C9AB24}">
+                <p16:designElem xmlns:p16="http://schemas.microsoft.com/office/powerpoint/2015/main" val="1"/>
+              </p:ext>
+            </p:extLst>
+          </p:nvPr>
+        </p:nvSpPr>
+        <p:spPr>
+          <a:xfrm rot="4759070" flipV="1">
+            <a:off x="6034138" y="-673140"/>
+            <a:ext cx="4021193" cy="4021193"/>
+          </a:xfrm>
+          <a:prstGeom prst="arc">
+            <a:avLst>
+              <a:gd name="adj1" fmla="val 16200000"/>
+              <a:gd name="adj2" fmla="val 20093138"/>
+            </a:avLst>
+          </a:prstGeom>
+          <a:ln w="127000" cap="rnd">
+            <a:solidFill>
+              <a:schemeClr val="accent4"/>
+            </a:solidFill>
+            <a:prstDash val="dash"/>
+          </a:ln>
+        </p:spPr>
+        <p:style>
+          <a:lnRef idx="1">
+            <a:schemeClr val="accent1"/>
+          </a:lnRef>
+          <a:fillRef idx="0">
+            <a:schemeClr val="accent1"/>
+          </a:fillRef>
+          <a:effectRef idx="0">
+            <a:schemeClr val="accent1"/>
+          </a:effectRef>
+          <a:fontRef idx="minor">
+            <a:schemeClr val="tx1"/>
+          </a:fontRef>
+        </p:style>
+        <p:txBody>
+          <a:bodyPr rtlCol="0" anchor="ctr"/>
+          <a:lstStyle/>
+          <a:p>
+            <a:pPr algn="ctr"/>
+            <a:endParaRPr lang="en-US" dirty="0"/>
+          </a:p>
+        </p:txBody>
+      </p:sp>
       <p:pic>
         <p:nvPicPr>
           <p:cNvPr id="10" name="Imagem 9" descr="Logotipo">
@@ -5055,13 +5196,13 @@
               </a:ext>
             </a:extLst>
           </a:blip>
-          <a:srcRect t="21404" r="-1" b="27541"/>
+          <a:srcRect l="6305" r="2" b="2"/>
           <a:stretch/>
         </p:blipFill>
         <p:spPr>
           <a:xfrm>
-            <a:off x="4726728" y="3802961"/>
-            <a:ext cx="7472381" cy="3055043"/>
+            <a:off x="6261607" y="1"/>
+            <a:ext cx="3519312" cy="3007909"/>
           </a:xfrm>
           <a:custGeom>
             <a:avLst/>
@@ -5070,159 +5211,35 @@
             <a:cxnLst/>
             <a:rect l="l" t="t" r="r" b="b"/>
             <a:pathLst>
-              <a:path w="7472381" h="3055043">
+              <a:path w="3519312" h="3007909">
                 <a:moveTo>
-                  <a:pt x="638975" y="0"/>
+                  <a:pt x="519780" y="0"/>
                 </a:moveTo>
                 <a:lnTo>
-                  <a:pt x="7472381" y="0"/>
+                  <a:pt x="2999532" y="0"/>
                 </a:lnTo>
                 <a:lnTo>
-                  <a:pt x="7472381" y="2579984"/>
+                  <a:pt x="3003921" y="3989"/>
                 </a:lnTo>
-                <a:lnTo>
-                  <a:pt x="7472381" y="3055043"/>
-                </a:lnTo>
-                <a:lnTo>
-                  <a:pt x="6992676" y="3055043"/>
-                </a:lnTo>
-                <a:lnTo>
-                  <a:pt x="1946893" y="3055043"/>
-                </a:lnTo>
-                <a:cubicBezTo>
-                  <a:pt x="1801205" y="2983605"/>
-                  <a:pt x="1662624" y="2897880"/>
-                  <a:pt x="1506276" y="2855018"/>
-                </a:cubicBezTo>
-                <a:cubicBezTo>
-                  <a:pt x="1399675" y="2826443"/>
-                  <a:pt x="1296627" y="2776437"/>
-                  <a:pt x="1314394" y="2626417"/>
-                </a:cubicBezTo>
-                <a:cubicBezTo>
-                  <a:pt x="1317947" y="2583555"/>
-                  <a:pt x="1289520" y="2551409"/>
-                  <a:pt x="1246880" y="2562124"/>
-                </a:cubicBezTo>
-                <a:cubicBezTo>
-                  <a:pt x="1165153" y="2583555"/>
-                  <a:pt x="1126065" y="2522833"/>
-                  <a:pt x="1079872" y="2476399"/>
-                </a:cubicBezTo>
-                <a:cubicBezTo>
-                  <a:pt x="998144" y="2394247"/>
-                  <a:pt x="919970" y="2308520"/>
-                  <a:pt x="788495" y="2294233"/>
-                </a:cubicBezTo>
-                <a:cubicBezTo>
-                  <a:pt x="813369" y="2229939"/>
-                  <a:pt x="856009" y="2237083"/>
-                  <a:pt x="895097" y="2251371"/>
-                </a:cubicBezTo>
-                <a:cubicBezTo>
-                  <a:pt x="998144" y="2287090"/>
-                  <a:pt x="1101192" y="2326380"/>
-                  <a:pt x="1204239" y="2362099"/>
-                </a:cubicBezTo>
-                <a:cubicBezTo>
-                  <a:pt x="1271754" y="2383530"/>
-                  <a:pt x="1339267" y="2415677"/>
-                  <a:pt x="1428102" y="2390674"/>
-                </a:cubicBezTo>
-                <a:cubicBezTo>
-                  <a:pt x="1349928" y="2262087"/>
-                  <a:pt x="1218453" y="2237083"/>
-                  <a:pt x="1111852" y="2197793"/>
-                </a:cubicBezTo>
-                <a:cubicBezTo>
-                  <a:pt x="980377" y="2147787"/>
-                  <a:pt x="902203" y="2054918"/>
-                  <a:pt x="806262" y="1947762"/>
-                </a:cubicBezTo>
-                <a:cubicBezTo>
-                  <a:pt x="902203" y="1919187"/>
-                  <a:pt x="962610" y="1997768"/>
-                  <a:pt x="1040785" y="1994196"/>
-                </a:cubicBezTo>
-                <a:cubicBezTo>
-                  <a:pt x="1044338" y="1983480"/>
-                  <a:pt x="1051445" y="1962049"/>
-                  <a:pt x="1051445" y="1962049"/>
-                </a:cubicBezTo>
-                <a:cubicBezTo>
-                  <a:pt x="923523" y="1904899"/>
-                  <a:pt x="866670" y="1797743"/>
-                  <a:pt x="845349" y="1665583"/>
-                </a:cubicBezTo>
-                <a:cubicBezTo>
-                  <a:pt x="838243" y="1597718"/>
-                  <a:pt x="792049" y="1576287"/>
-                  <a:pt x="745855" y="1544140"/>
-                </a:cubicBezTo>
-                <a:cubicBezTo>
-                  <a:pt x="589507" y="1433411"/>
-                  <a:pt x="422499" y="1333399"/>
-                  <a:pt x="291024" y="1183381"/>
-                </a:cubicBezTo>
-                <a:cubicBezTo>
-                  <a:pt x="443819" y="1201239"/>
-                  <a:pt x="564633" y="1301252"/>
-                  <a:pt x="724535" y="1344115"/>
-                </a:cubicBezTo>
-                <a:cubicBezTo>
-                  <a:pt x="596614" y="1179808"/>
-                  <a:pt x="429605" y="1094083"/>
-                  <a:pt x="276811" y="994071"/>
-                </a:cubicBezTo>
-                <a:cubicBezTo>
-                  <a:pt x="205743" y="947637"/>
-                  <a:pt x="141783" y="890486"/>
-                  <a:pt x="60055" y="865484"/>
-                </a:cubicBezTo>
-                <a:cubicBezTo>
-                  <a:pt x="31628" y="858340"/>
-                  <a:pt x="-18119" y="840481"/>
-                  <a:pt x="6755" y="790474"/>
-                </a:cubicBezTo>
-                <a:cubicBezTo>
-                  <a:pt x="28075" y="747612"/>
-                  <a:pt x="67162" y="761900"/>
-                  <a:pt x="102696" y="772614"/>
-                </a:cubicBezTo>
-                <a:cubicBezTo>
-                  <a:pt x="187976" y="801190"/>
-                  <a:pt x="280364" y="801190"/>
-                  <a:pt x="397625" y="801190"/>
-                </a:cubicBezTo>
-                <a:cubicBezTo>
-                  <a:pt x="298131" y="665458"/>
-                  <a:pt x="116909" y="708321"/>
-                  <a:pt x="31628" y="565446"/>
-                </a:cubicBezTo>
-                <a:cubicBezTo>
-                  <a:pt x="138229" y="540444"/>
-                  <a:pt x="219957" y="590450"/>
-                  <a:pt x="305237" y="601165"/>
-                </a:cubicBezTo>
-                <a:cubicBezTo>
-                  <a:pt x="383412" y="611881"/>
-                  <a:pt x="401178" y="586877"/>
-                  <a:pt x="383412" y="508296"/>
-                </a:cubicBezTo>
-                <a:cubicBezTo>
-                  <a:pt x="354985" y="386853"/>
-                  <a:pt x="397625" y="326130"/>
-                  <a:pt x="511333" y="358278"/>
-                </a:cubicBezTo>
-                <a:cubicBezTo>
-                  <a:pt x="617934" y="390424"/>
-                  <a:pt x="628594" y="343990"/>
-                  <a:pt x="600167" y="276124"/>
-                </a:cubicBezTo>
-                <a:cubicBezTo>
-                  <a:pt x="557527" y="176112"/>
-                  <a:pt x="603720" y="97531"/>
-                  <a:pt x="635701" y="11805"/>
+                <a:cubicBezTo>
+                  <a:pt x="3322356" y="322424"/>
+                  <a:pt x="3519312" y="762338"/>
+                  <a:pt x="3519312" y="1248253"/>
+                </a:cubicBezTo>
+                <a:cubicBezTo>
+                  <a:pt x="3519312" y="2220084"/>
+                  <a:pt x="2731487" y="3007909"/>
+                  <a:pt x="1759656" y="3007909"/>
+                </a:cubicBezTo>
+                <a:cubicBezTo>
+                  <a:pt x="787826" y="3007909"/>
+                  <a:pt x="0" y="2220084"/>
+                  <a:pt x="0" y="1248253"/>
+                </a:cubicBezTo>
+                <a:cubicBezTo>
+                  <a:pt x="0" y="762338"/>
+                  <a:pt x="196957" y="322424"/>
+                  <a:pt x="515392" y="3989"/>
                 </a:cubicBezTo>
                 <a:close/>
               </a:path>
@@ -5455,10 +5472,10 @@
       </p:grpSpPr>
       <p:sp useBgFill="1">
         <p:nvSpPr>
-          <p:cNvPr id="34" name="Rectangle 29">
+          <p:cNvPr id="44" name="Rectangle 39">
             <a:extLst>
               <a:ext uri="{FF2B5EF4-FFF2-40B4-BE49-F238E27FC236}">
-                <a16:creationId xmlns:a16="http://schemas.microsoft.com/office/drawing/2014/main" id="{04812C46-200A-4DEB-A05E-3ED6C68C2387}"/>
+                <a16:creationId xmlns:a16="http://schemas.microsoft.com/office/drawing/2014/main" id="{23E547B5-89CF-4EC0-96DE-25771AED0799}"/>
               </a:ext>
               <a:ext uri="{C183D7F6-B498-43B3-948B-1728B52AA6E4}">
                 <adec:decorative xmlns:adec="http://schemas.microsoft.com/office/drawing/2017/decorative" val="1"/>
@@ -5478,12 +5495,93 @@
         </p:nvSpPr>
         <p:spPr>
           <a:xfrm>
-            <a:off x="-1" y="0"/>
-            <a:ext cx="12188952" cy="6858000"/>
+            <a:off x="0" y="0"/>
+            <a:ext cx="12192000" cy="6858000"/>
           </a:xfrm>
           <a:prstGeom prst="rect">
             <a:avLst/>
           </a:prstGeom>
+          <a:ln w="12700" cap="flat" cmpd="sng" algn="ctr">
+            <a:noFill/>
+            <a:prstDash val="solid"/>
+            <a:miter lim="800000"/>
+          </a:ln>
+          <a:effectLst/>
+          <a:extLst>
+            <a:ext uri="{91240B29-F687-4F45-9708-019B960494DF}">
+              <a14:hiddenLine xmlns:a14="http://schemas.microsoft.com/office/drawing/2010/main" w="12700" cap="flat" cmpd="sng" algn="ctr">
+                <a:solidFill>
+                  <a:schemeClr val="accent1">
+                    <a:shade val="50000"/>
+                  </a:schemeClr>
+                </a:solidFill>
+                <a:prstDash val="solid"/>
+                <a:miter lim="800000"/>
+              </a14:hiddenLine>
+            </a:ext>
+          </a:extLst>
+        </p:spPr>
+        <p:style>
+          <a:lnRef idx="2">
+            <a:schemeClr val="accent1">
+              <a:shade val="50000"/>
+            </a:schemeClr>
+          </a:lnRef>
+          <a:fillRef idx="1">
+            <a:schemeClr val="accent1"/>
+          </a:fillRef>
+          <a:effectRef idx="0">
+            <a:schemeClr val="accent1"/>
+          </a:effectRef>
+          <a:fontRef idx="minor">
+            <a:schemeClr val="lt1"/>
+          </a:fontRef>
+        </p:style>
+        <p:txBody>
+          <a:bodyPr rtlCol="0" anchor="ctr"/>
+          <a:lstStyle/>
+          <a:p>
+            <a:pPr algn="ctr"/>
+            <a:endParaRPr lang="en-US"/>
+          </a:p>
+        </p:txBody>
+      </p:sp>
+      <p:sp>
+        <p:nvSpPr>
+          <p:cNvPr id="45" name="Rectangle 41">
+            <a:extLst>
+              <a:ext uri="{FF2B5EF4-FFF2-40B4-BE49-F238E27FC236}">
+                <a16:creationId xmlns:a16="http://schemas.microsoft.com/office/drawing/2014/main" id="{3F0B8CEB-8279-4E5E-A0CE-1FC9F71736F2}"/>
+              </a:ext>
+              <a:ext uri="{C183D7F6-B498-43B3-948B-1728B52AA6E4}">
+                <adec:decorative xmlns:adec="http://schemas.microsoft.com/office/drawing/2017/decorative" val="1"/>
+              </a:ext>
+            </a:extLst>
+          </p:cNvPr>
+          <p:cNvSpPr>
+            <a:spLocks noGrp="1" noRot="1" noChangeAspect="1" noMove="1" noResize="1" noEditPoints="1" noAdjustHandles="1" noChangeArrowheads="1" noChangeShapeType="1" noTextEdit="1"/>
+          </p:cNvSpPr>
+          <p:nvPr>
+            <p:extLst>
+              <p:ext uri="{386F3935-93C4-4BCD-93E2-E3B085C9AB24}">
+                <p16:designElem xmlns:p16="http://schemas.microsoft.com/office/powerpoint/2015/main" val="1"/>
+              </p:ext>
+            </p:extLst>
+          </p:nvPr>
+        </p:nvSpPr>
+        <p:spPr>
+          <a:xfrm>
+            <a:off x="4770782" y="0"/>
+            <a:ext cx="7421217" cy="6857999"/>
+          </a:xfrm>
+          <a:prstGeom prst="rect">
+            <a:avLst/>
+          </a:prstGeom>
+          <a:solidFill>
+            <a:srgbClr val="82766A">
+              <a:alpha val="15000"/>
+            </a:srgbClr>
+          </a:solidFill>
           <a:ln>
             <a:noFill/>
           </a:ln>
@@ -5513,12 +5611,64 @@
           </a:p>
         </p:txBody>
       </p:sp>
+      <p:sp>
+        <p:nvSpPr>
+          <p:cNvPr id="5" name="TextBox 4">
+            <a:extLst>
+              <a:ext uri="{FF2B5EF4-FFF2-40B4-BE49-F238E27FC236}">
+                <a16:creationId xmlns:a16="http://schemas.microsoft.com/office/drawing/2014/main" id="{1A896630-1A95-9B86-FC63-EDB87F6BCFB8}"/>
+              </a:ext>
+            </a:extLst>
+          </p:cNvPr>
+          <p:cNvSpPr txBox="1"/>
+          <p:nvPr/>
+        </p:nvSpPr>
+        <p:spPr>
+          <a:xfrm>
+            <a:off x="7320466" y="609600"/>
+            <a:ext cx="4140014" cy="1330839"/>
+          </a:xfrm>
+          <a:prstGeom prst="rect">
+            <a:avLst/>
+          </a:prstGeom>
+        </p:spPr>
+        <p:txBody>
+          <a:bodyPr rot="0" spcFirstLastPara="0" vertOverflow="overflow" horzOverflow="overflow" vert="horz" lIns="91440" tIns="45720" rIns="91440" bIns="45720" numCol="1" spcCol="0" rtlCol="0" fromWordArt="0" anchor="ctr" anchorCtr="0" forceAA="0" compatLnSpc="1">
+            <a:prstTxWarp prst="textNoShape">
+              <a:avLst/>
+            </a:prstTxWarp>
+            <a:normAutofit/>
+          </a:bodyPr>
+          <a:lstStyle/>
+          <a:p>
+            <a:pPr>
+              <a:lnSpc>
+                <a:spcPct val="90000"/>
+              </a:lnSpc>
+              <a:spcBef>
+                <a:spcPct val="0"/>
+              </a:spcBef>
+              <a:spcAft>
+                <a:spcPts val="600"/>
+              </a:spcAft>
+            </a:pPr>
+            <a:r>
+              <a:rPr lang="en-US" sz="4400" b="1" i="1" u="sng">
+                <a:latin typeface="+mj-lt"/>
+                <a:ea typeface="+mj-ea"/>
+                <a:cs typeface="+mj-cs"/>
+              </a:rPr>
+              <a:t>Lições do anime:</a:t>
+            </a:r>
+          </a:p>
+        </p:txBody>
+      </p:sp>
       <p:pic>
         <p:nvPicPr>
-          <p:cNvPr id="10" name="Imagem 9" descr="Imagem digital fictícia de personagem de desenho animado">
+          <p:cNvPr id="3" name="Imagem 2" descr="Imagem digital fictícia de personagem de desenho animado&#10;&#10;Descrição gerada automaticamente com confiança baixa">
             <a:extLst>
               <a:ext uri="{FF2B5EF4-FFF2-40B4-BE49-F238E27FC236}">
-                <a16:creationId xmlns:a16="http://schemas.microsoft.com/office/drawing/2014/main" id="{8B0ACD6F-56FC-15AA-E971-96910FA94FD6}"/>
+                <a16:creationId xmlns:a16="http://schemas.microsoft.com/office/drawing/2014/main" id="{7035C009-EF6A-A26E-7C3A-DA2E9B79B20E}"/>
               </a:ext>
             </a:extLst>
           </p:cNvPr>
@@ -5535,157 +5685,393 @@
               </a:ext>
             </a:extLst>
           </a:blip>
-          <a:srcRect l="20469" r="220"/>
+          <a:srcRect r="-2" b="632"/>
           <a:stretch/>
         </p:blipFill>
         <p:spPr>
           <a:xfrm>
-            <a:off x="0" y="0"/>
-            <a:ext cx="9669642" cy="6857990"/>
+            <a:off x="20" y="10"/>
+            <a:ext cx="6901711" cy="6857990"/>
           </a:xfrm>
-          <a:prstGeom prst="rect">
+          <a:custGeom>
             <a:avLst/>
-          </a:prstGeom>
+            <a:gdLst/>
+            <a:ahLst/>
+            <a:cxnLst/>
+            <a:rect l="l" t="t" r="r" b="b"/>
+            <a:pathLst>
+              <a:path w="6901731" h="6858000">
+                <a:moveTo>
+                  <a:pt x="0" y="0"/>
+                </a:moveTo>
+                <a:lnTo>
+                  <a:pt x="6897896" y="5958"/>
+                </a:lnTo>
+                <a:lnTo>
+                  <a:pt x="6866823" y="62592"/>
+                </a:lnTo>
+                <a:lnTo>
+                  <a:pt x="6901731" y="89476"/>
+                </a:lnTo>
+                <a:lnTo>
+                  <a:pt x="6901731" y="103833"/>
+                </a:lnTo>
+                <a:lnTo>
+                  <a:pt x="6900034" y="110092"/>
+                </a:lnTo>
+                <a:lnTo>
+                  <a:pt x="6901731" y="113679"/>
+                </a:lnTo>
+                <a:lnTo>
+                  <a:pt x="6901731" y="405560"/>
+                </a:lnTo>
+                <a:lnTo>
+                  <a:pt x="6900456" y="429509"/>
+                </a:lnTo>
+                <a:cubicBezTo>
+                  <a:pt x="6892773" y="535647"/>
+                  <a:pt x="6878314" y="537918"/>
+                  <a:pt x="6886342" y="636808"/>
+                </a:cubicBezTo>
+                <a:cubicBezTo>
+                  <a:pt x="6892506" y="756883"/>
+                  <a:pt x="6864504" y="771443"/>
+                  <a:pt x="6851784" y="839073"/>
+                </a:cubicBezTo>
+                <a:cubicBezTo>
+                  <a:pt x="6838675" y="892655"/>
+                  <a:pt x="6864124" y="961738"/>
+                  <a:pt x="6845760" y="994930"/>
+                </a:cubicBezTo>
+                <a:cubicBezTo>
+                  <a:pt x="6833572" y="1024166"/>
+                  <a:pt x="6859282" y="1058905"/>
+                  <a:pt x="6845601" y="1112932"/>
+                </a:cubicBezTo>
+                <a:cubicBezTo>
+                  <a:pt x="6838700" y="1149910"/>
+                  <a:pt x="6829138" y="1151035"/>
+                  <a:pt x="6820235" y="1187433"/>
+                </a:cubicBezTo>
+                <a:cubicBezTo>
+                  <a:pt x="6815504" y="1196464"/>
+                  <a:pt x="6777707" y="1338549"/>
+                  <a:pt x="6759643" y="1337010"/>
+                </a:cubicBezTo>
+                <a:cubicBezTo>
+                  <a:pt x="6737660" y="1337296"/>
+                  <a:pt x="6760650" y="1396341"/>
+                  <a:pt x="6736375" y="1382272"/>
+                </a:cubicBezTo>
+                <a:cubicBezTo>
+                  <a:pt x="6755741" y="1415836"/>
+                  <a:pt x="6714675" y="1414567"/>
+                  <a:pt x="6701292" y="1432111"/>
+                </a:cubicBezTo>
+                <a:cubicBezTo>
+                  <a:pt x="6721110" y="1460185"/>
+                  <a:pt x="6692106" y="1490815"/>
+                  <a:pt x="6686578" y="1518624"/>
+                </a:cubicBezTo>
+                <a:cubicBezTo>
+                  <a:pt x="6682512" y="1567002"/>
+                  <a:pt x="6679579" y="1571443"/>
+                  <a:pt x="6670824" y="1607743"/>
+                </a:cubicBezTo>
+                <a:cubicBezTo>
+                  <a:pt x="6671133" y="1629590"/>
+                  <a:pt x="6663161" y="1656870"/>
+                  <a:pt x="6664392" y="1696405"/>
+                </a:cubicBezTo>
+                <a:cubicBezTo>
+                  <a:pt x="6655686" y="1770486"/>
+                  <a:pt x="6641938" y="1757082"/>
+                  <a:pt x="6642880" y="1812372"/>
+                </a:cubicBezTo>
+                <a:cubicBezTo>
+                  <a:pt x="6638579" y="1872475"/>
+                  <a:pt x="6619231" y="1825476"/>
+                  <a:pt x="6612547" y="1876437"/>
+                </a:cubicBezTo>
+                <a:cubicBezTo>
+                  <a:pt x="6600695" y="1913834"/>
+                  <a:pt x="6591061" y="1923231"/>
+                  <a:pt x="6571760" y="1953331"/>
+                </a:cubicBezTo>
+                <a:cubicBezTo>
+                  <a:pt x="6561039" y="1989021"/>
+                  <a:pt x="6544090" y="2087896"/>
+                  <a:pt x="6520213" y="2096455"/>
+                </a:cubicBezTo>
+                <a:lnTo>
+                  <a:pt x="6492461" y="2188148"/>
+                </a:lnTo>
+                <a:cubicBezTo>
+                  <a:pt x="6504372" y="2211333"/>
+                  <a:pt x="6489131" y="2253220"/>
+                  <a:pt x="6471854" y="2259117"/>
+                </a:cubicBezTo>
+                <a:cubicBezTo>
+                  <a:pt x="6466151" y="2287829"/>
+                  <a:pt x="6440452" y="2301346"/>
+                  <a:pt x="6439832" y="2328334"/>
+                </a:cubicBezTo>
+                <a:cubicBezTo>
+                  <a:pt x="6431013" y="2351201"/>
+                  <a:pt x="6444250" y="2396409"/>
+                  <a:pt x="6425162" y="2408211"/>
+                </a:cubicBezTo>
+                <a:lnTo>
+                  <a:pt x="6417221" y="2427382"/>
+                </a:lnTo>
+                <a:lnTo>
+                  <a:pt x="6425030" y="2464387"/>
+                </a:lnTo>
+                <a:lnTo>
+                  <a:pt x="6406293" y="2472223"/>
+                </a:lnTo>
+                <a:cubicBezTo>
+                  <a:pt x="6406862" y="2477277"/>
+                  <a:pt x="6406486" y="2491723"/>
+                  <a:pt x="6405400" y="2493547"/>
+                </a:cubicBezTo>
+                <a:lnTo>
+                  <a:pt x="6374829" y="2532070"/>
+                </a:lnTo>
+                <a:cubicBezTo>
+                  <a:pt x="6374597" y="2545374"/>
+                  <a:pt x="6360976" y="2563797"/>
+                  <a:pt x="6350864" y="2577422"/>
+                </a:cubicBezTo>
+                <a:cubicBezTo>
+                  <a:pt x="6327056" y="2632768"/>
+                  <a:pt x="6341262" y="2616275"/>
+                  <a:pt x="6329174" y="2663854"/>
+                </a:cubicBezTo>
+                <a:cubicBezTo>
+                  <a:pt x="6326303" y="2703642"/>
+                  <a:pt x="6332854" y="2709643"/>
+                  <a:pt x="6315095" y="2741507"/>
+                </a:cubicBezTo>
+                <a:cubicBezTo>
+                  <a:pt x="6319921" y="2740191"/>
+                  <a:pt x="6321925" y="2742004"/>
+                  <a:pt x="6322463" y="2745641"/>
+                </a:cubicBezTo>
+                <a:cubicBezTo>
+                  <a:pt x="6322245" y="2747982"/>
+                  <a:pt x="6322027" y="2750323"/>
+                  <a:pt x="6321808" y="2752663"/>
+                </a:cubicBezTo>
+                <a:lnTo>
+                  <a:pt x="6314569" y="2756718"/>
+                </a:lnTo>
+                <a:cubicBezTo>
+                  <a:pt x="6289324" y="2773686"/>
+                  <a:pt x="6317551" y="2780051"/>
+                  <a:pt x="6315211" y="2811618"/>
+                </a:cubicBezTo>
+                <a:cubicBezTo>
+                  <a:pt x="6315620" y="2826627"/>
+                  <a:pt x="6296047" y="2885298"/>
+                  <a:pt x="6302211" y="2882314"/>
+                </a:cubicBezTo>
+                <a:lnTo>
+                  <a:pt x="6286167" y="2949597"/>
+                </a:lnTo>
+                <a:cubicBezTo>
+                  <a:pt x="6286401" y="2994618"/>
+                  <a:pt x="6286615" y="2971464"/>
+                  <a:pt x="6287037" y="3008578"/>
+                </a:cubicBezTo>
+                <a:cubicBezTo>
+                  <a:pt x="6293795" y="3029535"/>
+                  <a:pt x="6274405" y="3114154"/>
+                  <a:pt x="6259150" y="3123139"/>
+                </a:cubicBezTo>
+                <a:cubicBezTo>
+                  <a:pt x="6250085" y="3189063"/>
+                  <a:pt x="6269067" y="3151280"/>
+                  <a:pt x="6272249" y="3227854"/>
+                </a:cubicBezTo>
+                <a:cubicBezTo>
+                  <a:pt x="6278775" y="3295842"/>
+                  <a:pt x="6289216" y="3303765"/>
+                  <a:pt x="6292288" y="3378383"/>
+                </a:cubicBezTo>
+                <a:cubicBezTo>
+                  <a:pt x="6303894" y="3395995"/>
+                  <a:pt x="6287498" y="3432581"/>
+                  <a:pt x="6288328" y="3459618"/>
+                </a:cubicBezTo>
+                <a:cubicBezTo>
+                  <a:pt x="6289158" y="3486653"/>
+                  <a:pt x="6299937" y="3538735"/>
+                  <a:pt x="6297272" y="3540603"/>
+                </a:cubicBezTo>
+                <a:cubicBezTo>
+                  <a:pt x="6296849" y="3577379"/>
+                  <a:pt x="6294184" y="3587943"/>
+                  <a:pt x="6291001" y="3638374"/>
+                </a:cubicBezTo>
+                <a:cubicBezTo>
+                  <a:pt x="6283026" y="3666794"/>
+                  <a:pt x="6265833" y="3731744"/>
+                  <a:pt x="6283592" y="3763609"/>
+                </a:cubicBezTo>
+                <a:cubicBezTo>
+                  <a:pt x="6264286" y="3758340"/>
+                  <a:pt x="6290177" y="3803150"/>
+                  <a:pt x="6274068" y="3814506"/>
+                </a:cubicBezTo>
+                <a:cubicBezTo>
+                  <a:pt x="6260645" y="3821643"/>
+                  <a:pt x="6265372" y="3836902"/>
+                  <a:pt x="6262850" y="3850454"/>
+                </a:cubicBezTo>
+                <a:cubicBezTo>
+                  <a:pt x="6250418" y="3863479"/>
+                  <a:pt x="6250660" y="3955243"/>
+                  <a:pt x="6257357" y="3975474"/>
+                </a:cubicBezTo>
+                <a:cubicBezTo>
+                  <a:pt x="6245091" y="4036737"/>
+                  <a:pt x="6237535" y="4029237"/>
+                  <a:pt x="6257889" y="4073155"/>
+                </a:cubicBezTo>
+                <a:cubicBezTo>
+                  <a:pt x="6259272" y="4085906"/>
+                  <a:pt x="6239882" y="4116397"/>
+                  <a:pt x="6237441" y="4126638"/>
+                </a:cubicBezTo>
+                <a:lnTo>
+                  <a:pt x="6245587" y="4172738"/>
+                </a:lnTo>
+                <a:lnTo>
+                  <a:pt x="6235772" y="4176721"/>
+                </a:lnTo>
+                <a:lnTo>
+                  <a:pt x="6233287" y="4195136"/>
+                </a:lnTo>
+                <a:lnTo>
+                  <a:pt x="6234619" y="4280850"/>
+                </a:lnTo>
+                <a:cubicBezTo>
+                  <a:pt x="6239453" y="4320763"/>
+                  <a:pt x="6223309" y="4337596"/>
+                  <a:pt x="6219318" y="4402526"/>
+                </a:cubicBezTo>
+                <a:cubicBezTo>
+                  <a:pt x="6205466" y="4516209"/>
+                  <a:pt x="6216183" y="4588729"/>
+                  <a:pt x="6216810" y="4651172"/>
+                </a:cubicBezTo>
+                <a:cubicBezTo>
+                  <a:pt x="6217673" y="4756959"/>
+                  <a:pt x="6228654" y="4824005"/>
+                  <a:pt x="6225945" y="4916779"/>
+                </a:cubicBezTo>
+                <a:cubicBezTo>
+                  <a:pt x="6217032" y="4993010"/>
+                  <a:pt x="6264271" y="4984591"/>
+                  <a:pt x="6230174" y="5051379"/>
+                </a:cubicBezTo>
+                <a:cubicBezTo>
+                  <a:pt x="6235713" y="5056951"/>
+                  <a:pt x="6239420" y="5163714"/>
+                  <a:pt x="6242600" y="5170879"/>
+                </a:cubicBezTo>
+                <a:lnTo>
+                  <a:pt x="6235996" y="5216428"/>
+                </a:lnTo>
+                <a:lnTo>
+                  <a:pt x="6214638" y="5285298"/>
+                </a:lnTo>
+                <a:cubicBezTo>
+                  <a:pt x="6211392" y="5297492"/>
+                  <a:pt x="6225576" y="5312063"/>
+                  <a:pt x="6228432" y="5317696"/>
+                </a:cubicBezTo>
+                <a:lnTo>
+                  <a:pt x="6246496" y="5398787"/>
+                </a:lnTo>
+                <a:lnTo>
+                  <a:pt x="6244793" y="5399530"/>
+                </a:lnTo>
+                <a:lnTo>
+                  <a:pt x="6241695" y="5406948"/>
+                </a:lnTo>
+                <a:lnTo>
+                  <a:pt x="6267461" y="5499413"/>
+                </a:lnTo>
+                <a:cubicBezTo>
+                  <a:pt x="6285387" y="5533848"/>
+                  <a:pt x="6284888" y="5550029"/>
+                  <a:pt x="6295987" y="5582659"/>
+                </a:cubicBezTo>
+                <a:cubicBezTo>
+                  <a:pt x="6311253" y="5681724"/>
+                  <a:pt x="6295439" y="5695558"/>
+                  <a:pt x="6364803" y="5784263"/>
+                </a:cubicBezTo>
+                <a:cubicBezTo>
+                  <a:pt x="6379348" y="5818651"/>
+                  <a:pt x="6412475" y="5906802"/>
+                  <a:pt x="6423050" y="5922637"/>
+                </a:cubicBezTo>
+                <a:cubicBezTo>
+                  <a:pt x="6445210" y="5973612"/>
+                  <a:pt x="6468179" y="6023873"/>
+                  <a:pt x="6497767" y="6090108"/>
+                </a:cubicBezTo>
+                <a:cubicBezTo>
+                  <a:pt x="6571895" y="6150548"/>
+                  <a:pt x="6572491" y="6236583"/>
+                  <a:pt x="6606710" y="6281543"/>
+                </a:cubicBezTo>
+                <a:cubicBezTo>
+                  <a:pt x="6633675" y="6335892"/>
+                  <a:pt x="6654357" y="6388782"/>
+                  <a:pt x="6667540" y="6443715"/>
+                </a:cubicBezTo>
+                <a:cubicBezTo>
+                  <a:pt x="6685192" y="6466826"/>
+                  <a:pt x="6650500" y="6508701"/>
+                  <a:pt x="6659722" y="6550105"/>
+                </a:cubicBezTo>
+                <a:cubicBezTo>
+                  <a:pt x="6665926" y="6645044"/>
+                  <a:pt x="6669126" y="6627536"/>
+                  <a:pt x="6671805" y="6687397"/>
+                </a:cubicBezTo>
+                <a:cubicBezTo>
+                  <a:pt x="6682671" y="6733683"/>
+                  <a:pt x="6665210" y="6772117"/>
+                  <a:pt x="6669658" y="6806602"/>
+                </a:cubicBezTo>
+                <a:cubicBezTo>
+                  <a:pt x="6661174" y="6812658"/>
+                  <a:pt x="6667097" y="6831470"/>
+                  <a:pt x="6675783" y="6850325"/>
+                </a:cubicBezTo>
+                <a:lnTo>
+                  <a:pt x="6679704" y="6858000"/>
+                </a:lnTo>
+                <a:lnTo>
+                  <a:pt x="4532241" y="6858000"/>
+                </a:lnTo>
+                <a:lnTo>
+                  <a:pt x="1208596" y="6858000"/>
+                </a:lnTo>
+                <a:lnTo>
+                  <a:pt x="0" y="6858000"/>
+                </a:lnTo>
+                <a:close/>
+              </a:path>
+            </a:pathLst>
+          </a:custGeom>
         </p:spPr>
       </p:pic>
-      <p:sp>
-        <p:nvSpPr>
-          <p:cNvPr id="35" name="Rectangle 31">
-            <a:extLst>
-              <a:ext uri="{FF2B5EF4-FFF2-40B4-BE49-F238E27FC236}">
-                <a16:creationId xmlns:a16="http://schemas.microsoft.com/office/drawing/2014/main" id="{D1EA859B-E555-4109-94F3-6700E046E008}"/>
-              </a:ext>
-              <a:ext uri="{C183D7F6-B498-43B3-948B-1728B52AA6E4}">
-                <adec:decorative xmlns:adec="http://schemas.microsoft.com/office/drawing/2017/decorative" val="1"/>
-              </a:ext>
-            </a:extLst>
-          </p:cNvPr>
-          <p:cNvSpPr>
-            <a:spLocks noGrp="1" noRot="1" noChangeAspect="1" noMove="1" noResize="1" noEditPoints="1" noAdjustHandles="1" noChangeArrowheads="1" noChangeShapeType="1" noTextEdit="1"/>
-          </p:cNvSpPr>
-          <p:nvPr>
-            <p:extLst>
-              <p:ext uri="{386F3935-93C4-4BCD-93E2-E3B085C9AB24}">
-                <p16:designElem xmlns:p16="http://schemas.microsoft.com/office/powerpoint/2015/main" val="1"/>
-              </p:ext>
-            </p:extLst>
-          </p:nvPr>
-        </p:nvSpPr>
-        <p:spPr>
-          <a:xfrm flipH="1">
-            <a:off x="5125019" y="0"/>
-            <a:ext cx="7066978" cy="6858000"/>
-          </a:xfrm>
-          <a:prstGeom prst="rect">
-            <a:avLst/>
-          </a:prstGeom>
-          <a:gradFill>
-            <a:gsLst>
-              <a:gs pos="48000">
-                <a:schemeClr val="bg1"/>
-              </a:gs>
-              <a:gs pos="35000">
-                <a:schemeClr val="bg1">
-                  <a:alpha val="77000"/>
-                </a:schemeClr>
-              </a:gs>
-              <a:gs pos="19000">
-                <a:schemeClr val="bg1">
-                  <a:alpha val="38000"/>
-                </a:schemeClr>
-              </a:gs>
-              <a:gs pos="0">
-                <a:schemeClr val="bg1">
-                  <a:alpha val="0"/>
-                </a:schemeClr>
-              </a:gs>
-              <a:gs pos="100000">
-                <a:schemeClr val="bg1"/>
-              </a:gs>
-            </a:gsLst>
-            <a:lin ang="10800000" scaled="0"/>
-          </a:gradFill>
-          <a:ln>
-            <a:noFill/>
-          </a:ln>
-        </p:spPr>
-        <p:style>
-          <a:lnRef idx="2">
-            <a:schemeClr val="accent1">
-              <a:shade val="50000"/>
-            </a:schemeClr>
-          </a:lnRef>
-          <a:fillRef idx="1">
-            <a:schemeClr val="accent1"/>
-          </a:fillRef>
-          <a:effectRef idx="0">
-            <a:schemeClr val="accent1"/>
-          </a:effectRef>
-          <a:fontRef idx="minor">
-            <a:schemeClr val="lt1"/>
-          </a:fontRef>
-        </p:style>
-        <p:txBody>
-          <a:bodyPr rtlCol="0" anchor="ctr"/>
-          <a:lstStyle/>
-          <a:p>
-            <a:pPr algn="ctr"/>
-            <a:endParaRPr lang="en-US" dirty="0"/>
-          </a:p>
-        </p:txBody>
-      </p:sp>
-      <p:sp>
-        <p:nvSpPr>
-          <p:cNvPr id="5" name="TextBox 4">
-            <a:extLst>
-              <a:ext uri="{FF2B5EF4-FFF2-40B4-BE49-F238E27FC236}">
-                <a16:creationId xmlns:a16="http://schemas.microsoft.com/office/drawing/2014/main" id="{1A896630-1A95-9B86-FC63-EDB87F6BCFB8}"/>
-              </a:ext>
-            </a:extLst>
-          </p:cNvPr>
-          <p:cNvSpPr txBox="1"/>
-          <p:nvPr/>
-        </p:nvSpPr>
-        <p:spPr>
-          <a:xfrm>
-            <a:off x="7531610" y="365125"/>
-            <a:ext cx="3822189" cy="1899912"/>
-          </a:xfrm>
-          <a:prstGeom prst="rect">
-            <a:avLst/>
-          </a:prstGeom>
-        </p:spPr>
-        <p:txBody>
-          <a:bodyPr rot="0" spcFirstLastPara="0" vertOverflow="overflow" horzOverflow="overflow" vert="horz" lIns="91440" tIns="45720" rIns="91440" bIns="45720" numCol="1" spcCol="0" rtlCol="0" fromWordArt="0" anchor="ctr" anchorCtr="0" forceAA="0" compatLnSpc="1">
-            <a:prstTxWarp prst="textNoShape">
-              <a:avLst/>
-            </a:prstTxWarp>
-            <a:normAutofit/>
-          </a:bodyPr>
-          <a:lstStyle/>
-          <a:p>
-            <a:pPr>
-              <a:lnSpc>
-                <a:spcPct val="90000"/>
-              </a:lnSpc>
-              <a:spcBef>
-                <a:spcPct val="0"/>
-              </a:spcBef>
-              <a:spcAft>
-                <a:spcPts val="600"/>
-              </a:spcAft>
-            </a:pPr>
-            <a:r>
-              <a:rPr lang="en-US" sz="4000" b="1" i="1" u="sng" dirty="0">
-                <a:latin typeface="+mj-lt"/>
-                <a:ea typeface="+mj-ea"/>
-                <a:cs typeface="+mj-cs"/>
-              </a:rPr>
-              <a:t>Lições do anime:</a:t>
-            </a:r>
-          </a:p>
-        </p:txBody>
-      </p:sp>
       <p:sp>
         <p:nvSpPr>
           <p:cNvPr id="7" name="TextBox 6">
@@ -5700,8 +6086,8 @@
         </p:nvSpPr>
         <p:spPr>
           <a:xfrm>
-            <a:off x="7531610" y="2434201"/>
-            <a:ext cx="3822189" cy="3742762"/>
+            <a:off x="7320465" y="2194102"/>
+            <a:ext cx="4140013" cy="3908586"/>
           </a:xfrm>
           <a:prstGeom prst="rect">
             <a:avLst/>
@@ -5712,7 +6098,7 @@
             <a:prstTxWarp prst="textNoShape">
               <a:avLst/>
             </a:prstTxWarp>
-            <a:normAutofit fontScale="92500" lnSpcReduction="10000"/>
+            <a:normAutofit/>
           </a:bodyPr>
           <a:lstStyle/>
           <a:p>
@@ -5728,15 +6114,7 @@
             </a:pPr>
             <a:r>
               <a:rPr lang="en-US" sz="2000" b="1" dirty="0"/>
-              <a:t>"</a:t>
-            </a:r>
-            <a:r>
-              <a:rPr lang="pt-BR" sz="2000" b="1" dirty="0"/>
-              <a:t>devemos superar nossos limites, nossas inseguranças, nossos medos</a:t>
-            </a:r>
-            <a:r>
-              <a:rPr lang="en-US" sz="2000" b="1" dirty="0"/>
-              <a:t>!"</a:t>
+              <a:t>"devemos superar nossos limites, nossas inseguranças, nossos medos!"</a:t>
             </a:r>
           </a:p>
           <a:p>
@@ -5753,7 +6131,7 @@
             <a:endParaRPr lang="en-US" sz="2000" b="1" dirty="0"/>
           </a:p>
           <a:p>
-            <a:pPr marL="285750" indent="-228600">
+            <a:pPr marL="285750" indent="-228600" algn="just">
               <a:lnSpc>
                 <a:spcPct val="90000"/>
               </a:lnSpc>
@@ -5765,15 +6143,143 @@
             </a:pPr>
             <a:r>
               <a:rPr lang="en-US" sz="2000" b="1" dirty="0"/>
-              <a:t>"</a:t>
-            </a:r>
-            <a:r>
-              <a:rPr lang="pt-BR" sz="2000" b="1" dirty="0"/>
-              <a:t>Se você não gosta do seu destino, não o aceite. Em vez disso, tenha a coragem de mudá-lo do jeito que você quer que ele seja.</a:t>
+              <a:t>"Se </a:t>
+            </a:r>
+            <a:r>
+              <a:rPr lang="en-US" sz="2000" b="1" dirty="0" err="1"/>
+              <a:t>você</a:t>
             </a:r>
             <a:r>
               <a:rPr lang="en-US" sz="2000" b="1" dirty="0"/>
-              <a:t>."</a:t>
+              <a:t> </a:t>
+            </a:r>
+            <a:r>
+              <a:rPr lang="en-US" sz="2000" b="1" dirty="0" err="1"/>
+              <a:t>não</a:t>
+            </a:r>
+            <a:r>
+              <a:rPr lang="en-US" sz="2000" b="1" dirty="0"/>
+              <a:t> </a:t>
+            </a:r>
+            <a:r>
+              <a:rPr lang="en-US" sz="2000" b="1" dirty="0" err="1"/>
+              <a:t>gosta</a:t>
+            </a:r>
+            <a:r>
+              <a:rPr lang="en-US" sz="2000" b="1" dirty="0"/>
+              <a:t> do </a:t>
+            </a:r>
+            <a:r>
+              <a:rPr lang="en-US" sz="2000" b="1" dirty="0" err="1"/>
+              <a:t>seu</a:t>
+            </a:r>
+            <a:r>
+              <a:rPr lang="en-US" sz="2000" b="1" dirty="0"/>
+              <a:t> </a:t>
+            </a:r>
+            <a:r>
+              <a:rPr lang="en-US" sz="2000" b="1" dirty="0" err="1"/>
+              <a:t>destino</a:t>
+            </a:r>
+            <a:r>
+              <a:rPr lang="en-US" sz="2000" b="1" dirty="0"/>
+              <a:t>, </a:t>
+            </a:r>
+            <a:r>
+              <a:rPr lang="en-US" sz="2000" b="1" dirty="0" err="1"/>
+              <a:t>não</a:t>
+            </a:r>
+            <a:r>
+              <a:rPr lang="en-US" sz="2000" b="1" dirty="0"/>
+              <a:t> o </a:t>
+            </a:r>
+            <a:r>
+              <a:rPr lang="en-US" sz="2000" b="1" dirty="0" err="1"/>
+              <a:t>aceite</a:t>
+            </a:r>
+            <a:r>
+              <a:rPr lang="en-US" sz="2000" b="1" dirty="0"/>
+              <a:t>. Em </a:t>
+            </a:r>
+            <a:r>
+              <a:rPr lang="en-US" sz="2000" b="1" dirty="0" err="1"/>
+              <a:t>vez</a:t>
+            </a:r>
+            <a:r>
+              <a:rPr lang="en-US" sz="2000" b="1" dirty="0"/>
+              <a:t> </a:t>
+            </a:r>
+            <a:r>
+              <a:rPr lang="en-US" sz="2000" b="1" dirty="0" err="1"/>
+              <a:t>disso</a:t>
+            </a:r>
+            <a:r>
+              <a:rPr lang="en-US" sz="2000" b="1" dirty="0"/>
+              <a:t>, </a:t>
+            </a:r>
+            <a:r>
+              <a:rPr lang="en-US" sz="2000" b="1" dirty="0" err="1"/>
+              <a:t>tenha</a:t>
+            </a:r>
+            <a:r>
+              <a:rPr lang="en-US" sz="2000" b="1" dirty="0"/>
+              <a:t> a </a:t>
+            </a:r>
+            <a:r>
+              <a:rPr lang="en-US" sz="2000" b="1" dirty="0" err="1"/>
+              <a:t>coragem</a:t>
+            </a:r>
+            <a:r>
+              <a:rPr lang="en-US" sz="2000" b="1" dirty="0"/>
+              <a:t> de </a:t>
+            </a:r>
+            <a:r>
+              <a:rPr lang="en-US" sz="2000" b="1" dirty="0" err="1"/>
+              <a:t>mudá</a:t>
+            </a:r>
+            <a:r>
+              <a:rPr lang="en-US" sz="2000" b="1" dirty="0"/>
+              <a:t>-lo do </a:t>
+            </a:r>
+            <a:r>
+              <a:rPr lang="en-US" sz="2000" b="1" dirty="0" err="1"/>
+              <a:t>jeito</a:t>
+            </a:r>
+            <a:r>
+              <a:rPr lang="en-US" sz="2000" b="1" dirty="0"/>
+              <a:t> que </a:t>
+            </a:r>
+            <a:r>
+              <a:rPr lang="en-US" sz="2000" b="1" dirty="0" err="1"/>
+              <a:t>você</a:t>
+            </a:r>
+            <a:r>
+              <a:rPr lang="en-US" sz="2000" b="1" dirty="0"/>
+              <a:t> </a:t>
+            </a:r>
+            <a:r>
+              <a:rPr lang="en-US" sz="2000" b="1" dirty="0" err="1"/>
+              <a:t>quer</a:t>
+            </a:r>
+            <a:r>
+              <a:rPr lang="en-US" sz="2000" b="1" dirty="0"/>
+              <a:t> que </a:t>
+            </a:r>
+            <a:r>
+              <a:rPr lang="en-US" sz="2000" b="1" dirty="0" err="1"/>
+              <a:t>ele</a:t>
+            </a:r>
+            <a:r>
+              <a:rPr lang="en-US" sz="2000" b="1" dirty="0"/>
+              <a:t> </a:t>
+            </a:r>
+            <a:r>
+              <a:rPr lang="en-US" sz="2000" b="1" dirty="0" err="1"/>
+              <a:t>seja</a:t>
+            </a:r>
+            <a:r>
+              <a:rPr lang="en-US" sz="2000" b="1" dirty="0"/>
+              <a:t>.."</a:t>
             </a:r>
           </a:p>
           <a:p>
@@ -5805,12 +6311,92 @@
               <a:t>"</a:t>
             </a:r>
             <a:r>
-              <a:rPr lang="pt-BR" sz="2000" b="1" dirty="0"/>
-              <a:t>Não é o rosto que faz de alguém um monstro, são as escolhas que elas fazem para as suas vidas.</a:t>
+              <a:rPr lang="en-US" sz="2000" b="1" dirty="0" err="1"/>
+              <a:t>Não</a:t>
             </a:r>
             <a:r>
               <a:rPr lang="en-US" sz="2000" b="1" dirty="0"/>
-              <a:t>."</a:t>
+              <a:t> é o </a:t>
+            </a:r>
+            <a:r>
+              <a:rPr lang="en-US" sz="2000" b="1" dirty="0" err="1"/>
+              <a:t>rosto</a:t>
+            </a:r>
+            <a:r>
+              <a:rPr lang="en-US" sz="2000" b="1" dirty="0"/>
+              <a:t> que </a:t>
+            </a:r>
+            <a:r>
+              <a:rPr lang="en-US" sz="2000" b="1" dirty="0" err="1"/>
+              <a:t>faz</a:t>
+            </a:r>
+            <a:r>
+              <a:rPr lang="en-US" sz="2000" b="1" dirty="0"/>
+              <a:t> de </a:t>
+            </a:r>
+            <a:r>
+              <a:rPr lang="en-US" sz="2000" b="1" dirty="0" err="1"/>
+              <a:t>alguém</a:t>
+            </a:r>
+            <a:r>
+              <a:rPr lang="en-US" sz="2000" b="1" dirty="0"/>
+              <a:t> um </a:t>
+            </a:r>
+            <a:r>
+              <a:rPr lang="en-US" sz="2000" b="1" dirty="0" err="1"/>
+              <a:t>monstro</a:t>
+            </a:r>
+            <a:r>
+              <a:rPr lang="en-US" sz="2000" b="1" dirty="0"/>
+              <a:t>, </a:t>
+            </a:r>
+            <a:r>
+              <a:rPr lang="en-US" sz="2000" b="1" dirty="0" err="1"/>
+              <a:t>são</a:t>
+            </a:r>
+            <a:r>
+              <a:rPr lang="en-US" sz="2000" b="1" dirty="0"/>
+              <a:t> as </a:t>
+            </a:r>
+            <a:r>
+              <a:rPr lang="en-US" sz="2000" b="1" dirty="0" err="1"/>
+              <a:t>escolhas</a:t>
+            </a:r>
+            <a:r>
+              <a:rPr lang="en-US" sz="2000" b="1" dirty="0"/>
+              <a:t> que </a:t>
+            </a:r>
+            <a:r>
+              <a:rPr lang="en-US" sz="2000" b="1" dirty="0" err="1"/>
+              <a:t>elas</a:t>
+            </a:r>
+            <a:r>
+              <a:rPr lang="en-US" sz="2000" b="1" dirty="0"/>
+              <a:t> </a:t>
+            </a:r>
+            <a:r>
+              <a:rPr lang="en-US" sz="2000" b="1" dirty="0" err="1"/>
+              <a:t>fazem</a:t>
+            </a:r>
+            <a:r>
+              <a:rPr lang="en-US" sz="2000" b="1" dirty="0"/>
+              <a:t> para as </a:t>
+            </a:r>
+            <a:r>
+              <a:rPr lang="en-US" sz="2000" b="1" dirty="0" err="1"/>
+              <a:t>suas</a:t>
+            </a:r>
+            <a:r>
+              <a:rPr lang="en-US" sz="2000" b="1" dirty="0"/>
+              <a:t> </a:t>
+            </a:r>
+            <a:r>
+              <a:rPr lang="en-US" sz="2000" b="1" dirty="0" err="1"/>
+              <a:t>vidas</a:t>
+            </a:r>
+            <a:r>
+              <a:rPr lang="en-US" sz="2000" b="1" dirty="0"/>
+              <a:t>.."</a:t>
             </a:r>
           </a:p>
         </p:txBody>
@@ -6204,6 +6790,579 @@
 </file>
 
 <file path=ppt/slides/slide5.xml><?xml version="1.0" encoding="utf-8"?>
+<p:sld xmlns:a="http://schemas.openxmlformats.org/drawingml/2006/main" xmlns:r="http://schemas.openxmlformats.org/officeDocument/2006/relationships" xmlns:p="http://schemas.openxmlformats.org/presentationml/2006/main">
+  <p:cSld>
+    <p:bg>
+      <p:bgPr>
+        <a:solidFill>
+          <a:schemeClr val="bg1"/>
+        </a:solidFill>
+        <a:effectLst/>
+      </p:bgPr>
+    </p:bg>
+    <p:spTree>
+      <p:nvGrpSpPr>
+        <p:cNvPr id="1" name=""/>
+        <p:cNvGrpSpPr/>
+        <p:nvPr/>
+      </p:nvGrpSpPr>
+      <p:grpSpPr>
+        <a:xfrm>
+          <a:off x="0" y="0"/>
+          <a:ext cx="0" cy="0"/>
+          <a:chOff x="0" y="0"/>
+          <a:chExt cx="0" cy="0"/>
+        </a:xfrm>
+      </p:grpSpPr>
+      <p:sp useBgFill="1">
+        <p:nvSpPr>
+          <p:cNvPr id="31" name="Rectangle 26">
+            <a:extLst>
+              <a:ext uri="{FF2B5EF4-FFF2-40B4-BE49-F238E27FC236}">
+                <a16:creationId xmlns:a16="http://schemas.microsoft.com/office/drawing/2014/main" id="{9B7AD9F6-8CE7-4299-8FC6-328F4DCD3FF9}"/>
+              </a:ext>
+              <a:ext uri="{C183D7F6-B498-43B3-948B-1728B52AA6E4}">
+                <adec:decorative xmlns:adec="http://schemas.microsoft.com/office/drawing/2017/decorative" val="1"/>
+              </a:ext>
+            </a:extLst>
+          </p:cNvPr>
+          <p:cNvSpPr>
+            <a:spLocks noGrp="1" noRot="1" noChangeAspect="1" noMove="1" noResize="1" noEditPoints="1" noAdjustHandles="1" noChangeArrowheads="1" noChangeShapeType="1" noTextEdit="1"/>
+          </p:cNvSpPr>
+          <p:nvPr>
+            <p:extLst>
+              <p:ext uri="{386F3935-93C4-4BCD-93E2-E3B085C9AB24}">
+                <p16:designElem xmlns:p16="http://schemas.microsoft.com/office/powerpoint/2015/main" val="1"/>
+              </p:ext>
+            </p:extLst>
+          </p:nvPr>
+        </p:nvSpPr>
+        <p:spPr>
+          <a:xfrm>
+            <a:off x="0" y="0"/>
+            <a:ext cx="12188952" cy="6858000"/>
+          </a:xfrm>
+          <a:prstGeom prst="rect">
+            <a:avLst/>
+          </a:prstGeom>
+          <a:ln>
+            <a:noFill/>
+          </a:ln>
+        </p:spPr>
+        <p:style>
+          <a:lnRef idx="2">
+            <a:schemeClr val="accent1">
+              <a:shade val="50000"/>
+            </a:schemeClr>
+          </a:lnRef>
+          <a:fillRef idx="1">
+            <a:schemeClr val="accent1"/>
+          </a:fillRef>
+          <a:effectRef idx="0">
+            <a:schemeClr val="accent1"/>
+          </a:effectRef>
+          <a:fontRef idx="minor">
+            <a:schemeClr val="lt1"/>
+          </a:fontRef>
+        </p:style>
+        <p:txBody>
+          <a:bodyPr rtlCol="0" anchor="ctr"/>
+          <a:lstStyle/>
+          <a:p>
+            <a:pPr algn="ctr"/>
+            <a:endParaRPr lang="en-US"/>
+          </a:p>
+        </p:txBody>
+      </p:sp>
+      <p:sp>
+        <p:nvSpPr>
+          <p:cNvPr id="2" name="Título 1">
+            <a:extLst>
+              <a:ext uri="{FF2B5EF4-FFF2-40B4-BE49-F238E27FC236}">
+                <a16:creationId xmlns:a16="http://schemas.microsoft.com/office/drawing/2014/main" id="{8C61047A-F507-3220-C854-848247EA23F8}"/>
+              </a:ext>
+            </a:extLst>
+          </p:cNvPr>
+          <p:cNvSpPr>
+            <a:spLocks noGrp="1"/>
+          </p:cNvSpPr>
+          <p:nvPr>
+            <p:ph type="title"/>
+          </p:nvPr>
+        </p:nvSpPr>
+        <p:spPr>
+          <a:xfrm>
+            <a:off x="890338" y="640080"/>
+            <a:ext cx="3734014" cy="3566160"/>
+          </a:xfrm>
+        </p:spPr>
+        <p:txBody>
+          <a:bodyPr vert="horz" lIns="91440" tIns="45720" rIns="91440" bIns="45720" rtlCol="0" anchor="b">
+            <a:normAutofit/>
+          </a:bodyPr>
+          <a:lstStyle/>
+          <a:p>
+            <a:r>
+              <a:rPr lang="en-US" sz="2500" b="1" dirty="0">
+                <a:solidFill>
+                  <a:schemeClr val="accent2"/>
+                </a:solidFill>
+                <a:latin typeface="Arial" panose="020B0604020202020204" pitchFamily="34" charset="0"/>
+                <a:cs typeface="Arial" panose="020B0604020202020204" pitchFamily="34" charset="0"/>
+              </a:rPr>
+              <a:t>SITE INSTITUCIONAL</a:t>
+            </a:r>
+            <a:br>
+              <a:rPr lang="en-US" sz="4200" dirty="0"/>
+            </a:br>
+            <a:endParaRPr lang="en-US" sz="4200" dirty="0"/>
+          </a:p>
+        </p:txBody>
+      </p:sp>
+      <p:sp>
+        <p:nvSpPr>
+          <p:cNvPr id="32" name="sketchy line">
+            <a:extLst>
+              <a:ext uri="{FF2B5EF4-FFF2-40B4-BE49-F238E27FC236}">
+                <a16:creationId xmlns:a16="http://schemas.microsoft.com/office/drawing/2014/main" id="{F49775AF-8896-43EE-92C6-83497D6DC56F}"/>
+              </a:ext>
+              <a:ext uri="{C183D7F6-B498-43B3-948B-1728B52AA6E4}">
+                <adec:decorative xmlns:adec="http://schemas.microsoft.com/office/drawing/2017/decorative" val="1"/>
+              </a:ext>
+            </a:extLst>
+          </p:cNvPr>
+          <p:cNvSpPr>
+            <a:spLocks noGrp="1" noRot="1" noChangeAspect="1" noMove="1" noResize="1" noEditPoints="1" noAdjustHandles="1" noChangeArrowheads="1" noChangeShapeType="1" noTextEdit="1"/>
+          </p:cNvSpPr>
+          <p:nvPr>
+            <p:extLst>
+              <p:ext uri="{386F3935-93C4-4BCD-93E2-E3B085C9AB24}">
+                <p16:designElem xmlns:p16="http://schemas.microsoft.com/office/powerpoint/2015/main" val="1"/>
+              </p:ext>
+            </p:extLst>
+          </p:nvPr>
+        </p:nvSpPr>
+        <p:spPr>
+          <a:xfrm>
+            <a:off x="890338" y="4409267"/>
+            <a:ext cx="3474720" cy="18288"/>
+          </a:xfrm>
+          <a:custGeom>
+            <a:avLst/>
+            <a:gdLst>
+              <a:gd name="connsiteX0" fmla="*/ 0 w 3474720"/>
+              <a:gd name="connsiteY0" fmla="*/ 0 h 18288"/>
+              <a:gd name="connsiteX1" fmla="*/ 694944 w 3474720"/>
+              <a:gd name="connsiteY1" fmla="*/ 0 h 18288"/>
+              <a:gd name="connsiteX2" fmla="*/ 1355141 w 3474720"/>
+              <a:gd name="connsiteY2" fmla="*/ 0 h 18288"/>
+              <a:gd name="connsiteX3" fmla="*/ 2015338 w 3474720"/>
+              <a:gd name="connsiteY3" fmla="*/ 0 h 18288"/>
+              <a:gd name="connsiteX4" fmla="*/ 2779776 w 3474720"/>
+              <a:gd name="connsiteY4" fmla="*/ 0 h 18288"/>
+              <a:gd name="connsiteX5" fmla="*/ 3474720 w 3474720"/>
+              <a:gd name="connsiteY5" fmla="*/ 0 h 18288"/>
+              <a:gd name="connsiteX6" fmla="*/ 3474720 w 3474720"/>
+              <a:gd name="connsiteY6" fmla="*/ 18288 h 18288"/>
+              <a:gd name="connsiteX7" fmla="*/ 2779776 w 3474720"/>
+              <a:gd name="connsiteY7" fmla="*/ 18288 h 18288"/>
+              <a:gd name="connsiteX8" fmla="*/ 2189074 w 3474720"/>
+              <a:gd name="connsiteY8" fmla="*/ 18288 h 18288"/>
+              <a:gd name="connsiteX9" fmla="*/ 1528877 w 3474720"/>
+              <a:gd name="connsiteY9" fmla="*/ 18288 h 18288"/>
+              <a:gd name="connsiteX10" fmla="*/ 868680 w 3474720"/>
+              <a:gd name="connsiteY10" fmla="*/ 18288 h 18288"/>
+              <a:gd name="connsiteX11" fmla="*/ 0 w 3474720"/>
+              <a:gd name="connsiteY11" fmla="*/ 18288 h 18288"/>
+              <a:gd name="connsiteX12" fmla="*/ 0 w 3474720"/>
+              <a:gd name="connsiteY12" fmla="*/ 0 h 18288"/>
+            </a:gdLst>
+            <a:ahLst/>
+            <a:cxnLst>
+              <a:cxn ang="0">
+                <a:pos x="connsiteX0" y="connsiteY0"/>
+              </a:cxn>
+              <a:cxn ang="0">
+                <a:pos x="connsiteX1" y="connsiteY1"/>
+              </a:cxn>
+              <a:cxn ang="0">
+                <a:pos x="connsiteX2" y="connsiteY2"/>
+              </a:cxn>
+              <a:cxn ang="0">
+                <a:pos x="connsiteX3" y="connsiteY3"/>
+              </a:cxn>
+              <a:cxn ang="0">
+                <a:pos x="connsiteX4" y="connsiteY4"/>
+              </a:cxn>
+              <a:cxn ang="0">
+                <a:pos x="connsiteX5" y="connsiteY5"/>
+              </a:cxn>
+              <a:cxn ang="0">
+                <a:pos x="connsiteX6" y="connsiteY6"/>
+              </a:cxn>
+              <a:cxn ang="0">
+                <a:pos x="connsiteX7" y="connsiteY7"/>
+              </a:cxn>
+              <a:cxn ang="0">
+                <a:pos x="connsiteX8" y="connsiteY8"/>
+              </a:cxn>
+              <a:cxn ang="0">
+                <a:pos x="connsiteX9" y="connsiteY9"/>
+              </a:cxn>
+              <a:cxn ang="0">
+                <a:pos x="connsiteX10" y="connsiteY10"/>
+              </a:cxn>
+              <a:cxn ang="0">
+                <a:pos x="connsiteX11" y="connsiteY11"/>
+              </a:cxn>
+              <a:cxn ang="0">
+                <a:pos x="connsiteX12" y="connsiteY12"/>
+              </a:cxn>
+            </a:cxnLst>
+            <a:rect l="l" t="t" r="r" b="b"/>
+            <a:pathLst>
+              <a:path w="3474720" h="18288" fill="none" extrusionOk="0">
+                <a:moveTo>
+                  <a:pt x="0" y="0"/>
+                </a:moveTo>
+                <a:cubicBezTo>
+                  <a:pt x="224454" y="-14544"/>
+                  <a:pt x="495407" y="26540"/>
+                  <a:pt x="694944" y="0"/>
+                </a:cubicBezTo>
+                <a:cubicBezTo>
+                  <a:pt x="894481" y="-26540"/>
+                  <a:pt x="1130063" y="24713"/>
+                  <a:pt x="1355141" y="0"/>
+                </a:cubicBezTo>
+                <a:cubicBezTo>
+                  <a:pt x="1580219" y="-24713"/>
+                  <a:pt x="1820099" y="26695"/>
+                  <a:pt x="2015338" y="0"/>
+                </a:cubicBezTo>
+                <a:cubicBezTo>
+                  <a:pt x="2210577" y="-26695"/>
+                  <a:pt x="2402045" y="165"/>
+                  <a:pt x="2779776" y="0"/>
+                </a:cubicBezTo>
+                <a:cubicBezTo>
+                  <a:pt x="3157507" y="-165"/>
+                  <a:pt x="3286859" y="-15571"/>
+                  <a:pt x="3474720" y="0"/>
+                </a:cubicBezTo>
+                <a:cubicBezTo>
+                  <a:pt x="3474286" y="7551"/>
+                  <a:pt x="3474253" y="9822"/>
+                  <a:pt x="3474720" y="18288"/>
+                </a:cubicBezTo>
+                <a:cubicBezTo>
+                  <a:pt x="3233904" y="29845"/>
+                  <a:pt x="2945134" y="-5256"/>
+                  <a:pt x="2779776" y="18288"/>
+                </a:cubicBezTo>
+                <a:cubicBezTo>
+                  <a:pt x="2614418" y="41832"/>
+                  <a:pt x="2339768" y="22709"/>
+                  <a:pt x="2189074" y="18288"/>
+                </a:cubicBezTo>
+                <a:cubicBezTo>
+                  <a:pt x="2038380" y="13867"/>
+                  <a:pt x="1817434" y="-4947"/>
+                  <a:pt x="1528877" y="18288"/>
+                </a:cubicBezTo>
+                <a:cubicBezTo>
+                  <a:pt x="1240320" y="41523"/>
+                  <a:pt x="1042447" y="37198"/>
+                  <a:pt x="868680" y="18288"/>
+                </a:cubicBezTo>
+                <a:cubicBezTo>
+                  <a:pt x="694913" y="-622"/>
+                  <a:pt x="233232" y="44909"/>
+                  <a:pt x="0" y="18288"/>
+                </a:cubicBezTo>
+                <a:cubicBezTo>
+                  <a:pt x="60" y="11696"/>
+                  <a:pt x="66" y="3758"/>
+                  <a:pt x="0" y="0"/>
+                </a:cubicBezTo>
+                <a:close/>
+              </a:path>
+              <a:path w="3474720" h="18288" stroke="0" extrusionOk="0">
+                <a:moveTo>
+                  <a:pt x="0" y="0"/>
+                </a:moveTo>
+                <a:cubicBezTo>
+                  <a:pt x="202328" y="-14716"/>
+                  <a:pt x="332722" y="-11499"/>
+                  <a:pt x="625450" y="0"/>
+                </a:cubicBezTo>
+                <a:cubicBezTo>
+                  <a:pt x="918178" y="11499"/>
+                  <a:pt x="1096688" y="5123"/>
+                  <a:pt x="1389888" y="0"/>
+                </a:cubicBezTo>
+                <a:cubicBezTo>
+                  <a:pt x="1683088" y="-5123"/>
+                  <a:pt x="1835981" y="-14038"/>
+                  <a:pt x="1980590" y="0"/>
+                </a:cubicBezTo>
+                <a:cubicBezTo>
+                  <a:pt x="2125199" y="14038"/>
+                  <a:pt x="2396099" y="-7203"/>
+                  <a:pt x="2571293" y="0"/>
+                </a:cubicBezTo>
+                <a:cubicBezTo>
+                  <a:pt x="2746487" y="7203"/>
+                  <a:pt x="3041609" y="-12036"/>
+                  <a:pt x="3474720" y="0"/>
+                </a:cubicBezTo>
+                <a:cubicBezTo>
+                  <a:pt x="3474638" y="4406"/>
+                  <a:pt x="3474631" y="9982"/>
+                  <a:pt x="3474720" y="18288"/>
+                </a:cubicBezTo>
+                <a:cubicBezTo>
+                  <a:pt x="3324873" y="21876"/>
+                  <a:pt x="3136771" y="12587"/>
+                  <a:pt x="2814523" y="18288"/>
+                </a:cubicBezTo>
+                <a:cubicBezTo>
+                  <a:pt x="2492275" y="23989"/>
+                  <a:pt x="2294402" y="47111"/>
+                  <a:pt x="2154326" y="18288"/>
+                </a:cubicBezTo>
+                <a:cubicBezTo>
+                  <a:pt x="2014250" y="-10535"/>
+                  <a:pt x="1820317" y="33903"/>
+                  <a:pt x="1494130" y="18288"/>
+                </a:cubicBezTo>
+                <a:cubicBezTo>
+                  <a:pt x="1167943" y="2673"/>
+                  <a:pt x="948432" y="14868"/>
+                  <a:pt x="729691" y="18288"/>
+                </a:cubicBezTo>
+                <a:cubicBezTo>
+                  <a:pt x="510950" y="21708"/>
+                  <a:pt x="264032" y="24354"/>
+                  <a:pt x="0" y="18288"/>
+                </a:cubicBezTo>
+                <a:cubicBezTo>
+                  <a:pt x="189" y="14288"/>
+                  <a:pt x="-703" y="3747"/>
+                  <a:pt x="0" y="0"/>
+                </a:cubicBezTo>
+                <a:close/>
+              </a:path>
+            </a:pathLst>
+          </a:custGeom>
+          <a:solidFill>
+            <a:schemeClr val="accent2"/>
+          </a:solidFill>
+          <a:ln w="44450" cap="rnd">
+            <a:solidFill>
+              <a:schemeClr val="accent2"/>
+            </a:solidFill>
+            <a:round/>
+            <a:extLst>
+              <a:ext uri="{C807C97D-BFC1-408E-A445-0C87EB9F89A2}">
+                <ask:lineSketchStyleProps xmlns:ask="http://schemas.microsoft.com/office/drawing/2018/sketchyshapes" sd="2863741219">
+                  <a:prstGeom prst="rect">
+                    <a:avLst/>
+                  </a:prstGeom>
+                  <ask:type>
+                    <ask:lineSketchFreehand/>
+                  </ask:type>
+                </ask:lineSketchStyleProps>
+              </a:ext>
+            </a:extLst>
+          </a:ln>
+        </p:spPr>
+        <p:style>
+          <a:lnRef idx="2">
+            <a:schemeClr val="accent1">
+              <a:shade val="50000"/>
+            </a:schemeClr>
+          </a:lnRef>
+          <a:fillRef idx="1">
+            <a:schemeClr val="accent1"/>
+          </a:fillRef>
+          <a:effectRef idx="0">
+            <a:schemeClr val="accent1"/>
+          </a:effectRef>
+          <a:fontRef idx="minor">
+            <a:schemeClr val="lt1"/>
+          </a:fontRef>
+        </p:style>
+        <p:txBody>
+          <a:bodyPr rtlCol="0" anchor="ctr"/>
+          <a:lstStyle/>
+          <a:p>
+            <a:pPr algn="ctr"/>
+            <a:endParaRPr lang="en-US"/>
+          </a:p>
+        </p:txBody>
+      </p:sp>
+      <p:pic>
+        <p:nvPicPr>
+          <p:cNvPr id="6" name="Imagem 5" descr="Padrão do plano de fundo">
+            <a:extLst>
+              <a:ext uri="{FF2B5EF4-FFF2-40B4-BE49-F238E27FC236}">
+                <a16:creationId xmlns:a16="http://schemas.microsoft.com/office/drawing/2014/main" id="{C34C55CE-7F8D-FCCC-F92A-BFF6F499DAE2}"/>
+              </a:ext>
+            </a:extLst>
+          </p:cNvPr>
+          <p:cNvPicPr>
+            <a:picLocks noChangeAspect="1"/>
+          </p:cNvPicPr>
+          <p:nvPr/>
+        </p:nvPicPr>
+        <p:blipFill rotWithShape="1">
+          <a:blip r:embed="rId2">
+            <a:extLst>
+              <a:ext uri="{28A0092B-C50C-407E-A947-70E740481C1C}">
+                <a14:useLocalDpi xmlns:a14="http://schemas.microsoft.com/office/drawing/2010/main" val="0"/>
+              </a:ext>
+            </a:extLst>
+          </a:blip>
+          <a:srcRect b="303"/>
+          <a:stretch/>
+        </p:blipFill>
+        <p:spPr>
+          <a:xfrm>
+            <a:off x="5311702" y="10"/>
+            <a:ext cx="6878775" cy="6857990"/>
+          </a:xfrm>
+          <a:custGeom>
+            <a:avLst/>
+            <a:gdLst/>
+            <a:ahLst/>
+            <a:cxnLst/>
+            <a:rect l="l" t="t" r="r" b="b"/>
+            <a:pathLst>
+              <a:path w="6878775" h="6858000">
+                <a:moveTo>
+                  <a:pt x="1102973" y="0"/>
+                </a:moveTo>
+                <a:lnTo>
+                  <a:pt x="1160688" y="0"/>
+                </a:lnTo>
+                <a:lnTo>
+                  <a:pt x="983189" y="331786"/>
+                </a:lnTo>
+                <a:cubicBezTo>
+                  <a:pt x="914866" y="469145"/>
+                  <a:pt x="850355" y="608712"/>
+                  <a:pt x="789261" y="750263"/>
+                </a:cubicBezTo>
+                <a:cubicBezTo>
+                  <a:pt x="774307" y="784928"/>
+                  <a:pt x="759992" y="819849"/>
+                  <a:pt x="745295" y="854514"/>
+                </a:cubicBezTo>
+                <a:cubicBezTo>
+                  <a:pt x="756682" y="845393"/>
+                  <a:pt x="765489" y="833492"/>
+                  <a:pt x="770857" y="819975"/>
+                </a:cubicBezTo>
+                <a:cubicBezTo>
+                  <a:pt x="879943" y="589569"/>
+                  <a:pt x="999605" y="365513"/>
+                  <a:pt x="1131329" y="148742"/>
+                </a:cubicBezTo>
+                <a:lnTo>
+                  <a:pt x="1227589" y="0"/>
+                </a:lnTo>
+                <a:lnTo>
+                  <a:pt x="6878775" y="0"/>
+                </a:lnTo>
+                <a:lnTo>
+                  <a:pt x="6878775" y="6858000"/>
+                </a:lnTo>
+                <a:lnTo>
+                  <a:pt x="713521" y="6858000"/>
+                </a:lnTo>
+                <a:lnTo>
+                  <a:pt x="625642" y="6670527"/>
+                </a:lnTo>
+                <a:cubicBezTo>
+                  <a:pt x="507232" y="6398531"/>
+                  <a:pt x="403083" y="6118381"/>
+                  <a:pt x="312785" y="5830359"/>
+                </a:cubicBezTo>
+                <a:cubicBezTo>
+                  <a:pt x="278149" y="5719759"/>
+                  <a:pt x="248879" y="5607635"/>
+                  <a:pt x="212198" y="5480401"/>
+                </a:cubicBezTo>
+                <a:cubicBezTo>
+                  <a:pt x="212208" y="5491601"/>
+                  <a:pt x="212803" y="5502788"/>
+                  <a:pt x="213988" y="5513923"/>
+                </a:cubicBezTo>
+                <a:cubicBezTo>
+                  <a:pt x="264089" y="5723695"/>
+                  <a:pt x="307290" y="5935370"/>
+                  <a:pt x="365826" y="6142729"/>
+                </a:cubicBezTo>
+                <a:cubicBezTo>
+                  <a:pt x="433152" y="6380817"/>
+                  <a:pt x="510068" y="6614016"/>
+                  <a:pt x="597975" y="6841549"/>
+                </a:cubicBezTo>
+                <a:lnTo>
+                  <a:pt x="604824" y="6858000"/>
+                </a:lnTo>
+                <a:lnTo>
+                  <a:pt x="552056" y="6858000"/>
+                </a:lnTo>
+                <a:lnTo>
+                  <a:pt x="539576" y="6828295"/>
+                </a:lnTo>
+                <a:cubicBezTo>
+                  <a:pt x="380597" y="6414594"/>
+                  <a:pt x="260223" y="5988893"/>
+                  <a:pt x="171555" y="5552906"/>
+                </a:cubicBezTo>
+                <a:cubicBezTo>
+                  <a:pt x="91163" y="5157998"/>
+                  <a:pt x="43746" y="4758899"/>
+                  <a:pt x="12305" y="4357388"/>
+                </a:cubicBezTo>
+                <a:cubicBezTo>
+                  <a:pt x="-14281" y="4013908"/>
+                  <a:pt x="4507" y="3672965"/>
+                  <a:pt x="46684" y="3331516"/>
+                </a:cubicBezTo>
+                <a:cubicBezTo>
+                  <a:pt x="127203" y="2664286"/>
+                  <a:pt x="277819" y="2007265"/>
+                  <a:pt x="496065" y="1371196"/>
+                </a:cubicBezTo>
+                <a:cubicBezTo>
+                  <a:pt x="636273" y="966066"/>
+                  <a:pt x="800445" y="573253"/>
+                  <a:pt x="995723" y="196614"/>
+                </a:cubicBezTo>
+                <a:close/>
+              </a:path>
+            </a:pathLst>
+          </a:custGeom>
+        </p:spPr>
+      </p:pic>
+    </p:spTree>
+    <p:extLst>
+      <p:ext uri="{BB962C8B-B14F-4D97-AF65-F5344CB8AC3E}">
+        <p14:creationId xmlns:p14="http://schemas.microsoft.com/office/powerpoint/2010/main" val="1031959723"/>
+      </p:ext>
+    </p:extLst>
+  </p:cSld>
+  <p:clrMapOvr>
+    <a:masterClrMapping/>
+  </p:clrMapOvr>
+</p:sld>
+</file>
+
+<file path=ppt/slides/slide6.xml><?xml version="1.0" encoding="utf-8"?>
 <p:sld xmlns:a="http://schemas.openxmlformats.org/drawingml/2006/main" xmlns:r="http://schemas.openxmlformats.org/officeDocument/2006/relationships" xmlns:p="http://schemas.openxmlformats.org/presentationml/2006/main">
   <p:cSld>
     <p:bg>
@@ -10934,7 +12093,7 @@
               <a:buChar char="•"/>
             </a:pPr>
             <a:r>
-              <a:rPr lang="en-US" sz="2000" b="1" i="1" u="sng"/>
+              <a:rPr lang="en-US" sz="2000" b="1" i="1" u="sng" dirty="0"/>
               <a:t>Ferramentas Utilizadas:</a:t>
             </a:r>
           </a:p>
@@ -10949,7 +12108,7 @@
               <a:buFont typeface="Arial" panose="020B0604020202020204" pitchFamily="34" charset="0"/>
               <a:buChar char="•"/>
             </a:pPr>
-            <a:endParaRPr lang="en-US" sz="2000"/>
+            <a:endParaRPr lang="en-US" sz="2000" dirty="0"/>
           </a:p>
         </p:txBody>
       </p:sp>
@@ -10978,7 +12137,7 @@
 </p:sld>
 </file>
 
-<file path=ppt/slides/slide6.xml><?xml version="1.0" encoding="utf-8"?>
+<file path=ppt/slides/slide7.xml><?xml version="1.0" encoding="utf-8"?>
 <p:sld xmlns:a="http://schemas.openxmlformats.org/drawingml/2006/main" xmlns:r="http://schemas.openxmlformats.org/officeDocument/2006/relationships" xmlns:p="http://schemas.openxmlformats.org/presentationml/2006/main">
   <p:cSld>
     <p:bg>
@@ -11890,6 +13049,14 @@
 </file>
 
 <file path=customXml/item1.xml><?xml version="1.0" encoding="utf-8"?>
+<p:properties xmlns:p="http://schemas.microsoft.com/office/2006/metadata/properties" xmlns:xsi="http://www.w3.org/2001/XMLSchema-instance" xmlns:pc="http://schemas.microsoft.com/office/infopath/2007/PartnerControls">
+  <documentManagement>
+    <_activity xmlns="58bd19be-68b1-440c-82af-6d4de24fec6c" xsi:nil="true"/>
+  </documentManagement>
+</p:properties>
+</file>
+
+<file path=customXml/item2.xml><?xml version="1.0" encoding="utf-8"?>
 <ct:contentTypeSchema xmlns:ct="http://schemas.microsoft.com/office/2006/metadata/contentType" xmlns:ma="http://schemas.microsoft.com/office/2006/metadata/properties/metaAttributes" ct:_="" ma:_="" ma:contentTypeName="Document" ma:contentTypeID="0x0101003236BA383373F9498A6F9C22979A1745" ma:contentTypeVersion="7" ma:contentTypeDescription="Create a new document." ma:contentTypeScope="" ma:versionID="7a3e7d22c603736153f09bd6daba6233">
   <xsd:schema xmlns:xsd="http://www.w3.org/2001/XMLSchema" xmlns:xs="http://www.w3.org/2001/XMLSchema" xmlns:p="http://schemas.microsoft.com/office/2006/metadata/properties" xmlns:ns3="58bd19be-68b1-440c-82af-6d4de24fec6c" xmlns:ns4="3ffc9a63-5890-437d-bab6-67d84705b086" targetNamespace="http://schemas.microsoft.com/office/2006/metadata/properties" ma:root="true" ma:fieldsID="4b4b094821844d29a55f3b35349bd224" ns3:_="" ns4:_="">
     <xsd:import namespace="58bd19be-68b1-440c-82af-6d4de24fec6c"/>
@@ -12072,7 +13239,7 @@
 </ct:contentTypeSchema>
 </file>
 
-<file path=customXml/item2.xml><?xml version="1.0" encoding="utf-8"?>
+<file path=customXml/item3.xml><?xml version="1.0" encoding="utf-8"?>
 <?mso-contentType ?>
 <FormTemplates xmlns="http://schemas.microsoft.com/sharepoint/v3/contenttype/forms">
   <Display>DocumentLibraryForm</Display>
@@ -12081,15 +13248,24 @@
 </FormTemplates>
 </file>
 
-<file path=customXml/item3.xml><?xml version="1.0" encoding="utf-8"?>
-<p:properties xmlns:p="http://schemas.microsoft.com/office/2006/metadata/properties" xmlns:xsi="http://www.w3.org/2001/XMLSchema-instance" xmlns:pc="http://schemas.microsoft.com/office/infopath/2007/PartnerControls">
-  <documentManagement>
-    <_activity xmlns="58bd19be-68b1-440c-82af-6d4de24fec6c" xsi:nil="true"/>
-  </documentManagement>
-</p:properties>
+<file path=customXml/itemProps1.xml><?xml version="1.0" encoding="utf-8"?>
+<ds:datastoreItem xmlns:ds="http://schemas.openxmlformats.org/officeDocument/2006/customXml" ds:itemID="{B93870C2-E80B-409F-93F4-F91327D43629}">
+  <ds:schemaRefs>
+    <ds:schemaRef ds:uri="http://purl.org/dc/elements/1.1/"/>
+    <ds:schemaRef ds:uri="58bd19be-68b1-440c-82af-6d4de24fec6c"/>
+    <ds:schemaRef ds:uri="http://schemas.microsoft.com/office/2006/documentManagement/types"/>
+    <ds:schemaRef ds:uri="http://purl.org/dc/dcmitype/"/>
+    <ds:schemaRef ds:uri="http://www.w3.org/XML/1998/namespace"/>
+    <ds:schemaRef ds:uri="http://schemas.microsoft.com/office/infopath/2007/PartnerControls"/>
+    <ds:schemaRef ds:uri="http://schemas.openxmlformats.org/package/2006/metadata/core-properties"/>
+    <ds:schemaRef ds:uri="3ffc9a63-5890-437d-bab6-67d84705b086"/>
+    <ds:schemaRef ds:uri="http://schemas.microsoft.com/office/2006/metadata/properties"/>
+    <ds:schemaRef ds:uri="http://purl.org/dc/terms/"/>
+  </ds:schemaRefs>
+</ds:datastoreItem>
 </file>
 
-<file path=customXml/itemProps1.xml><?xml version="1.0" encoding="utf-8"?>
+<file path=customXml/itemProps2.xml><?xml version="1.0" encoding="utf-8"?>
 <ds:datastoreItem xmlns:ds="http://schemas.openxmlformats.org/officeDocument/2006/customXml" ds:itemID="{FB002CB7-DF2F-4070-A696-E9B9E2DDE4F0}">
   <ds:schemaRefs>
     <ds:schemaRef ds:uri="http://schemas.microsoft.com/office/2006/metadata/contentType"/>
@@ -12108,27 +13284,10 @@
 </ds:datastoreItem>
 </file>
 
-<file path=customXml/itemProps2.xml><?xml version="1.0" encoding="utf-8"?>
+<file path=customXml/itemProps3.xml><?xml version="1.0" encoding="utf-8"?>
 <ds:datastoreItem xmlns:ds="http://schemas.openxmlformats.org/officeDocument/2006/customXml" ds:itemID="{3691E454-F692-4D14-92A8-5C673A86F2AD}">
   <ds:schemaRefs>
     <ds:schemaRef ds:uri="http://schemas.microsoft.com/sharepoint/v3/contenttype/forms"/>
   </ds:schemaRefs>
 </ds:datastoreItem>
-</file>
-
-<file path=customXml/itemProps3.xml><?xml version="1.0" encoding="utf-8"?>
-<ds:datastoreItem xmlns:ds="http://schemas.openxmlformats.org/officeDocument/2006/customXml" ds:itemID="{B93870C2-E80B-409F-93F4-F91327D43629}">
-  <ds:schemaRefs>
-    <ds:schemaRef ds:uri="http://purl.org/dc/elements/1.1/"/>
-    <ds:schemaRef ds:uri="58bd19be-68b1-440c-82af-6d4de24fec6c"/>
-    <ds:schemaRef ds:uri="http://schemas.microsoft.com/office/2006/documentManagement/types"/>
-    <ds:schemaRef ds:uri="http://purl.org/dc/dcmitype/"/>
-    <ds:schemaRef ds:uri="http://www.w3.org/XML/1998/namespace"/>
-    <ds:schemaRef ds:uri="http://schemas.microsoft.com/office/infopath/2007/PartnerControls"/>
-    <ds:schemaRef ds:uri="http://schemas.openxmlformats.org/package/2006/metadata/core-properties"/>
-    <ds:schemaRef ds:uri="3ffc9a63-5890-437d-bab6-67d84705b086"/>
-    <ds:schemaRef ds:uri="http://schemas.microsoft.com/office/2006/metadata/properties"/>
-    <ds:schemaRef ds:uri="http://purl.org/dc/terms/"/>
-  </ds:schemaRefs>
-</ds:datastoreItem>
 </file>
</xml_diff>